<commit_message>
Sunday Bloody ... oh shut up Bono
</commit_message>
<xml_diff>
--- a/Day_3/Lab/Day_3_SystemsAnalysisForDataCuration.pptx
+++ b/Day_3/Lab/Day_3_SystemsAnalysisForDataCuration.pptx
@@ -5,13 +5,36 @@
     <p:sldMasterId id="2147483648" r:id="rId1"/>
   </p:sldMasterIdLst>
   <p:notesMasterIdLst>
-    <p:notesMasterId r:id="rId6"/>
+    <p:notesMasterId r:id="rId29"/>
   </p:notesMasterIdLst>
   <p:sldIdLst>
     <p:sldId id="256" r:id="rId2"/>
-    <p:sldId id="257" r:id="rId3"/>
-    <p:sldId id="258" r:id="rId4"/>
-    <p:sldId id="259" r:id="rId5"/>
+    <p:sldId id="260" r:id="rId3"/>
+    <p:sldId id="261" r:id="rId4"/>
+    <p:sldId id="262" r:id="rId5"/>
+    <p:sldId id="263" r:id="rId6"/>
+    <p:sldId id="257" r:id="rId7"/>
+    <p:sldId id="258" r:id="rId8"/>
+    <p:sldId id="259" r:id="rId9"/>
+    <p:sldId id="264" r:id="rId10"/>
+    <p:sldId id="267" r:id="rId11"/>
+    <p:sldId id="265" r:id="rId12"/>
+    <p:sldId id="266" r:id="rId13"/>
+    <p:sldId id="268" r:id="rId14"/>
+    <p:sldId id="269" r:id="rId15"/>
+    <p:sldId id="270" r:id="rId16"/>
+    <p:sldId id="271" r:id="rId17"/>
+    <p:sldId id="282" r:id="rId18"/>
+    <p:sldId id="272" r:id="rId19"/>
+    <p:sldId id="273" r:id="rId20"/>
+    <p:sldId id="274" r:id="rId21"/>
+    <p:sldId id="275" r:id="rId22"/>
+    <p:sldId id="276" r:id="rId23"/>
+    <p:sldId id="277" r:id="rId24"/>
+    <p:sldId id="278" r:id="rId25"/>
+    <p:sldId id="279" r:id="rId26"/>
+    <p:sldId id="280" r:id="rId27"/>
+    <p:sldId id="281" r:id="rId28"/>
   </p:sldIdLst>
   <p:sldSz cx="9144000" cy="6858000" type="screen4x3"/>
   <p:notesSz cx="6858000" cy="9144000"/>
@@ -195,7 +218,7 @@
           <a:p>
             <a:fld id="{1C801AD7-5359-914E-BFE3-5454938AEF16}" type="datetimeFigureOut">
               <a:rPr lang="en-US" smtClean="0"/>
-              <a:t>2/9/15</a:t>
+              <a:t>2/15/15</a:t>
             </a:fld>
             <a:endParaRPr lang="en-US"/>
           </a:p>
@@ -509,12 +532,117 @@
           <a:p>
             <a:r>
               <a:rPr lang="en-US" dirty="0" smtClean="0"/>
+              <a:t>Can be helpful if there is simply information to convey</a:t>
+            </a:r>
+            <a:r>
+              <a:rPr lang="en-US" baseline="0" dirty="0" smtClean="0"/>
+              <a:t> to an administrator, or someone unfamiliar with the lifecycle of data management… </a:t>
+            </a:r>
+            <a:endParaRPr lang="en-US" dirty="0"/>
+          </a:p>
+        </p:txBody>
+      </p:sp>
+      <p:sp>
+        <p:nvSpPr>
+          <p:cNvPr id="4" name="Slide Number Placeholder 3"/>
+          <p:cNvSpPr>
+            <a:spLocks noGrp="1"/>
+          </p:cNvSpPr>
+          <p:nvPr>
+            <p:ph type="sldNum" sz="quarter" idx="10"/>
+          </p:nvPr>
+        </p:nvSpPr>
+        <p:spPr/>
+        <p:txBody>
+          <a:bodyPr/>
+          <a:lstStyle/>
+          <a:p>
+            <a:fld id="{DD1B326B-FBB1-FA4E-9C02-8753E795E64A}" type="slidenum">
+              <a:rPr lang="en-US" smtClean="0"/>
+              <a:t>6</a:t>
+            </a:fld>
+            <a:endParaRPr lang="en-US"/>
+          </a:p>
+        </p:txBody>
+      </p:sp>
+    </p:spTree>
+    <p:extLst>
+      <p:ext uri="{BB962C8B-B14F-4D97-AF65-F5344CB8AC3E}">
+        <p14:creationId xmlns:p14="http://schemas.microsoft.com/office/powerpoint/2010/main" val="3998337526"/>
+      </p:ext>
+    </p:extLst>
+  </p:cSld>
+  <p:clrMapOvr>
+    <a:masterClrMapping/>
+  </p:clrMapOvr>
+</p:notes>
+</file>
+
+<file path=ppt/notesSlides/notesSlide2.xml><?xml version="1.0" encoding="utf-8"?>
+<p:notes xmlns:a="http://schemas.openxmlformats.org/drawingml/2006/main" xmlns:r="http://schemas.openxmlformats.org/officeDocument/2006/relationships" xmlns:p="http://schemas.openxmlformats.org/presentationml/2006/main">
+  <p:cSld>
+    <p:spTree>
+      <p:nvGrpSpPr>
+        <p:cNvPr id="1" name=""/>
+        <p:cNvGrpSpPr/>
+        <p:nvPr/>
+      </p:nvGrpSpPr>
+      <p:grpSpPr>
+        <a:xfrm>
+          <a:off x="0" y="0"/>
+          <a:ext cx="0" cy="0"/>
+          <a:chOff x="0" y="0"/>
+          <a:chExt cx="0" cy="0"/>
+        </a:xfrm>
+      </p:grpSpPr>
+      <p:sp>
+        <p:nvSpPr>
+          <p:cNvPr id="2" name="Slide Image Placeholder 1"/>
+          <p:cNvSpPr>
+            <a:spLocks noGrp="1" noRot="1" noChangeAspect="1"/>
+          </p:cNvSpPr>
+          <p:nvPr>
+            <p:ph type="sldImg"/>
+          </p:nvPr>
+        </p:nvSpPr>
+        <p:spPr/>
+      </p:sp>
+      <p:sp>
+        <p:nvSpPr>
+          <p:cNvPr id="3" name="Notes Placeholder 2"/>
+          <p:cNvSpPr>
+            <a:spLocks noGrp="1"/>
+          </p:cNvSpPr>
+          <p:nvPr>
+            <p:ph type="body" idx="1"/>
+          </p:nvPr>
+        </p:nvSpPr>
+        <p:spPr/>
+        <p:txBody>
+          <a:bodyPr/>
+          <a:lstStyle/>
+          <a:p>
+            <a:r>
+              <a:rPr lang="en-US" dirty="0" smtClean="0"/>
               <a:t>In</a:t>
             </a:r>
             <a:r>
               <a:rPr lang="en-US" baseline="0" dirty="0" smtClean="0"/>
               <a:t> a bit more detail… </a:t>
             </a:r>
+            <a:r>
+              <a:rPr lang="en-US" baseline="0" dirty="0" smtClean="0"/>
+              <a:t>but also a lot more difficult to parse out… this looks complicated, but we can’t really act on this information… </a:t>
+            </a:r>
+          </a:p>
+          <a:p>
+            <a:endParaRPr lang="en-US" baseline="0" dirty="0" smtClean="0"/>
+          </a:p>
+          <a:p>
+            <a:r>
+              <a:rPr lang="en-US" baseline="0" dirty="0" smtClean="0"/>
+              <a:t>And, imagine that this was all that was left from the person whom was previously in your job… how would you make sense of this? </a:t>
+            </a:r>
             <a:endParaRPr lang="en-US" dirty="0"/>
           </a:p>
         </p:txBody>
@@ -536,7 +664,7 @@
           <a:p>
             <a:fld id="{DD1B326B-FBB1-FA4E-9C02-8753E795E64A}" type="slidenum">
               <a:rPr lang="en-US" smtClean="0"/>
-              <a:t>3</a:t>
+              <a:t>7</a:t>
             </a:fld>
             <a:endParaRPr lang="en-US"/>
           </a:p>
@@ -546,6 +674,573 @@
     <p:extLst>
       <p:ext uri="{BB962C8B-B14F-4D97-AF65-F5344CB8AC3E}">
         <p14:creationId xmlns:p14="http://schemas.microsoft.com/office/powerpoint/2010/main" val="2294299381"/>
+      </p:ext>
+    </p:extLst>
+  </p:cSld>
+  <p:clrMapOvr>
+    <a:masterClrMapping/>
+  </p:clrMapOvr>
+</p:notes>
+</file>
+
+<file path=ppt/notesSlides/notesSlide3.xml><?xml version="1.0" encoding="utf-8"?>
+<p:notes xmlns:a="http://schemas.openxmlformats.org/drawingml/2006/main" xmlns:r="http://schemas.openxmlformats.org/officeDocument/2006/relationships" xmlns:p="http://schemas.openxmlformats.org/presentationml/2006/main">
+  <p:cSld>
+    <p:spTree>
+      <p:nvGrpSpPr>
+        <p:cNvPr id="1" name=""/>
+        <p:cNvGrpSpPr/>
+        <p:nvPr/>
+      </p:nvGrpSpPr>
+      <p:grpSpPr>
+        <a:xfrm>
+          <a:off x="0" y="0"/>
+          <a:ext cx="0" cy="0"/>
+          <a:chOff x="0" y="0"/>
+          <a:chExt cx="0" cy="0"/>
+        </a:xfrm>
+      </p:grpSpPr>
+      <p:sp>
+        <p:nvSpPr>
+          <p:cNvPr id="2" name="Slide Image Placeholder 1"/>
+          <p:cNvSpPr>
+            <a:spLocks noGrp="1" noRot="1" noChangeAspect="1"/>
+          </p:cNvSpPr>
+          <p:nvPr>
+            <p:ph type="sldImg"/>
+          </p:nvPr>
+        </p:nvSpPr>
+        <p:spPr/>
+      </p:sp>
+      <p:sp>
+        <p:nvSpPr>
+          <p:cNvPr id="3" name="Notes Placeholder 2"/>
+          <p:cNvSpPr>
+            <a:spLocks noGrp="1"/>
+          </p:cNvSpPr>
+          <p:nvPr>
+            <p:ph type="body" idx="1"/>
+          </p:nvPr>
+        </p:nvSpPr>
+        <p:spPr/>
+        <p:txBody>
+          <a:bodyPr/>
+          <a:lstStyle/>
+          <a:p>
+            <a:r>
+              <a:rPr lang="en-US" dirty="0" smtClean="0"/>
+              <a:t>This session is going to focus on these</a:t>
+            </a:r>
+            <a:r>
+              <a:rPr lang="en-US" baseline="0" dirty="0" smtClean="0"/>
+              <a:t> three activities in systems analysis and design. </a:t>
+            </a:r>
+            <a:endParaRPr lang="en-US" dirty="0"/>
+          </a:p>
+        </p:txBody>
+      </p:sp>
+      <p:sp>
+        <p:nvSpPr>
+          <p:cNvPr id="4" name="Slide Number Placeholder 3"/>
+          <p:cNvSpPr>
+            <a:spLocks noGrp="1"/>
+          </p:cNvSpPr>
+          <p:nvPr>
+            <p:ph type="sldNum" sz="quarter" idx="10"/>
+          </p:nvPr>
+        </p:nvSpPr>
+        <p:spPr/>
+        <p:txBody>
+          <a:bodyPr/>
+          <a:lstStyle/>
+          <a:p>
+            <a:fld id="{DD1B326B-FBB1-FA4E-9C02-8753E795E64A}" type="slidenum">
+              <a:rPr lang="en-US" smtClean="0"/>
+              <a:t>10</a:t>
+            </a:fld>
+            <a:endParaRPr lang="en-US"/>
+          </a:p>
+        </p:txBody>
+      </p:sp>
+    </p:spTree>
+    <p:extLst>
+      <p:ext uri="{BB962C8B-B14F-4D97-AF65-F5344CB8AC3E}">
+        <p14:creationId xmlns:p14="http://schemas.microsoft.com/office/powerpoint/2010/main" val="3234796700"/>
+      </p:ext>
+    </p:extLst>
+  </p:cSld>
+  <p:clrMapOvr>
+    <a:masterClrMapping/>
+  </p:clrMapOvr>
+</p:notes>
+</file>
+
+<file path=ppt/notesSlides/notesSlide4.xml><?xml version="1.0" encoding="utf-8"?>
+<p:notes xmlns:a="http://schemas.openxmlformats.org/drawingml/2006/main" xmlns:r="http://schemas.openxmlformats.org/officeDocument/2006/relationships" xmlns:p="http://schemas.openxmlformats.org/presentationml/2006/main">
+  <p:cSld>
+    <p:spTree>
+      <p:nvGrpSpPr>
+        <p:cNvPr id="1" name=""/>
+        <p:cNvGrpSpPr/>
+        <p:nvPr/>
+      </p:nvGrpSpPr>
+      <p:grpSpPr>
+        <a:xfrm>
+          <a:off x="0" y="0"/>
+          <a:ext cx="0" cy="0"/>
+          <a:chOff x="0" y="0"/>
+          <a:chExt cx="0" cy="0"/>
+        </a:xfrm>
+      </p:grpSpPr>
+      <p:sp>
+        <p:nvSpPr>
+          <p:cNvPr id="2" name="Slide Image Placeholder 1"/>
+          <p:cNvSpPr>
+            <a:spLocks noGrp="1" noRot="1" noChangeAspect="1"/>
+          </p:cNvSpPr>
+          <p:nvPr>
+            <p:ph type="sldImg"/>
+          </p:nvPr>
+        </p:nvSpPr>
+        <p:spPr/>
+      </p:sp>
+      <p:sp>
+        <p:nvSpPr>
+          <p:cNvPr id="3" name="Notes Placeholder 2"/>
+          <p:cNvSpPr>
+            <a:spLocks noGrp="1"/>
+          </p:cNvSpPr>
+          <p:nvPr>
+            <p:ph type="body" idx="1"/>
+          </p:nvPr>
+        </p:nvSpPr>
+        <p:spPr/>
+        <p:txBody>
+          <a:bodyPr/>
+          <a:lstStyle/>
+          <a:p>
+            <a:r>
+              <a:rPr lang="en-US" dirty="0" smtClean="0"/>
+              <a:t>Mix of approaches from information systems engineers, and software engineering</a:t>
+            </a:r>
+            <a:endParaRPr lang="en-US" dirty="0"/>
+          </a:p>
+        </p:txBody>
+      </p:sp>
+      <p:sp>
+        <p:nvSpPr>
+          <p:cNvPr id="4" name="Slide Number Placeholder 3"/>
+          <p:cNvSpPr>
+            <a:spLocks noGrp="1"/>
+          </p:cNvSpPr>
+          <p:nvPr>
+            <p:ph type="sldNum" sz="quarter" idx="10"/>
+          </p:nvPr>
+        </p:nvSpPr>
+        <p:spPr/>
+        <p:txBody>
+          <a:bodyPr/>
+          <a:lstStyle/>
+          <a:p>
+            <a:fld id="{DD1B326B-FBB1-FA4E-9C02-8753E795E64A}" type="slidenum">
+              <a:rPr lang="en-US" smtClean="0"/>
+              <a:t>11</a:t>
+            </a:fld>
+            <a:endParaRPr lang="en-US"/>
+          </a:p>
+        </p:txBody>
+      </p:sp>
+    </p:spTree>
+    <p:extLst>
+      <p:ext uri="{BB962C8B-B14F-4D97-AF65-F5344CB8AC3E}">
+        <p14:creationId xmlns:p14="http://schemas.microsoft.com/office/powerpoint/2010/main" val="2997443654"/>
+      </p:ext>
+    </p:extLst>
+  </p:cSld>
+  <p:clrMapOvr>
+    <a:masterClrMapping/>
+  </p:clrMapOvr>
+</p:notes>
+</file>
+
+<file path=ppt/notesSlides/notesSlide5.xml><?xml version="1.0" encoding="utf-8"?>
+<p:notes xmlns:a="http://schemas.openxmlformats.org/drawingml/2006/main" xmlns:r="http://schemas.openxmlformats.org/officeDocument/2006/relationships" xmlns:p="http://schemas.openxmlformats.org/presentationml/2006/main">
+  <p:cSld>
+    <p:spTree>
+      <p:nvGrpSpPr>
+        <p:cNvPr id="1" name=""/>
+        <p:cNvGrpSpPr/>
+        <p:nvPr/>
+      </p:nvGrpSpPr>
+      <p:grpSpPr>
+        <a:xfrm>
+          <a:off x="0" y="0"/>
+          <a:ext cx="0" cy="0"/>
+          <a:chOff x="0" y="0"/>
+          <a:chExt cx="0" cy="0"/>
+        </a:xfrm>
+      </p:grpSpPr>
+      <p:sp>
+        <p:nvSpPr>
+          <p:cNvPr id="2" name="Slide Image Placeholder 1"/>
+          <p:cNvSpPr>
+            <a:spLocks noGrp="1" noRot="1" noChangeAspect="1"/>
+          </p:cNvSpPr>
+          <p:nvPr>
+            <p:ph type="sldImg"/>
+          </p:nvPr>
+        </p:nvSpPr>
+        <p:spPr/>
+      </p:sp>
+      <p:sp>
+        <p:nvSpPr>
+          <p:cNvPr id="3" name="Notes Placeholder 2"/>
+          <p:cNvSpPr>
+            <a:spLocks noGrp="1"/>
+          </p:cNvSpPr>
+          <p:nvPr>
+            <p:ph type="body" idx="1"/>
+          </p:nvPr>
+        </p:nvSpPr>
+        <p:spPr/>
+        <p:txBody>
+          <a:bodyPr/>
+          <a:lstStyle/>
+          <a:p>
+            <a:r>
+              <a:rPr lang="en-US" dirty="0" smtClean="0"/>
+              <a:t>All used in conjunction</a:t>
+            </a:r>
+          </a:p>
+          <a:p>
+            <a:r>
+              <a:rPr lang="en-US" dirty="0" smtClean="0"/>
+              <a:t>All</a:t>
+            </a:r>
+            <a:r>
+              <a:rPr lang="en-US" baseline="0" dirty="0" smtClean="0"/>
+              <a:t> are tradeoff between time, money and </a:t>
+            </a:r>
+            <a:r>
+              <a:rPr lang="en-US" baseline="0" dirty="0" err="1" smtClean="0"/>
+              <a:t>throughness</a:t>
+            </a:r>
+            <a:r>
+              <a:rPr lang="en-US" baseline="0" dirty="0" smtClean="0"/>
+              <a:t>… </a:t>
+            </a:r>
+          </a:p>
+          <a:p>
+            <a:endParaRPr lang="en-US" baseline="0" dirty="0" smtClean="0"/>
+          </a:p>
+          <a:p>
+            <a:endParaRPr lang="en-US" dirty="0" smtClean="0"/>
+          </a:p>
+        </p:txBody>
+      </p:sp>
+      <p:sp>
+        <p:nvSpPr>
+          <p:cNvPr id="4" name="Slide Number Placeholder 3"/>
+          <p:cNvSpPr>
+            <a:spLocks noGrp="1"/>
+          </p:cNvSpPr>
+          <p:nvPr>
+            <p:ph type="sldNum" sz="quarter" idx="10"/>
+          </p:nvPr>
+        </p:nvSpPr>
+        <p:spPr/>
+        <p:txBody>
+          <a:bodyPr/>
+          <a:lstStyle/>
+          <a:p>
+            <a:fld id="{DD1B326B-FBB1-FA4E-9C02-8753E795E64A}" type="slidenum">
+              <a:rPr lang="en-US" smtClean="0"/>
+              <a:t>12</a:t>
+            </a:fld>
+            <a:endParaRPr lang="en-US"/>
+          </a:p>
+        </p:txBody>
+      </p:sp>
+    </p:spTree>
+    <p:extLst>
+      <p:ext uri="{BB962C8B-B14F-4D97-AF65-F5344CB8AC3E}">
+        <p14:creationId xmlns:p14="http://schemas.microsoft.com/office/powerpoint/2010/main" val="2350033644"/>
+      </p:ext>
+    </p:extLst>
+  </p:cSld>
+  <p:clrMapOvr>
+    <a:masterClrMapping/>
+  </p:clrMapOvr>
+</p:notes>
+</file>
+
+<file path=ppt/notesSlides/notesSlide6.xml><?xml version="1.0" encoding="utf-8"?>
+<p:notes xmlns:a="http://schemas.openxmlformats.org/drawingml/2006/main" xmlns:r="http://schemas.openxmlformats.org/officeDocument/2006/relationships" xmlns:p="http://schemas.openxmlformats.org/presentationml/2006/main">
+  <p:cSld>
+    <p:spTree>
+      <p:nvGrpSpPr>
+        <p:cNvPr id="1" name=""/>
+        <p:cNvGrpSpPr/>
+        <p:nvPr/>
+      </p:nvGrpSpPr>
+      <p:grpSpPr>
+        <a:xfrm>
+          <a:off x="0" y="0"/>
+          <a:ext cx="0" cy="0"/>
+          <a:chOff x="0" y="0"/>
+          <a:chExt cx="0" cy="0"/>
+        </a:xfrm>
+      </p:grpSpPr>
+      <p:sp>
+        <p:nvSpPr>
+          <p:cNvPr id="2" name="Slide Image Placeholder 1"/>
+          <p:cNvSpPr>
+            <a:spLocks noGrp="1" noRot="1" noChangeAspect="1"/>
+          </p:cNvSpPr>
+          <p:nvPr>
+            <p:ph type="sldImg"/>
+          </p:nvPr>
+        </p:nvSpPr>
+        <p:spPr/>
+      </p:sp>
+      <p:sp>
+        <p:nvSpPr>
+          <p:cNvPr id="3" name="Notes Placeholder 2"/>
+          <p:cNvSpPr>
+            <a:spLocks noGrp="1"/>
+          </p:cNvSpPr>
+          <p:nvPr>
+            <p:ph type="body" idx="1"/>
+          </p:nvPr>
+        </p:nvSpPr>
+        <p:spPr/>
+        <p:txBody>
+          <a:bodyPr/>
+          <a:lstStyle/>
+          <a:p>
+            <a:r>
+              <a:rPr lang="en-US" dirty="0" smtClean="0"/>
+              <a:t>Difficult to coordinate,</a:t>
+            </a:r>
+            <a:r>
+              <a:rPr lang="en-US" baseline="0" dirty="0" smtClean="0"/>
+              <a:t> and </a:t>
+            </a:r>
+            <a:r>
+              <a:rPr lang="en-US" baseline="0" dirty="0" err="1" smtClean="0"/>
+              <a:t>dificult</a:t>
+            </a:r>
+            <a:r>
+              <a:rPr lang="en-US" baseline="0" dirty="0" smtClean="0"/>
+              <a:t> </a:t>
+            </a:r>
+            <a:endParaRPr lang="en-US" dirty="0"/>
+          </a:p>
+        </p:txBody>
+      </p:sp>
+      <p:sp>
+        <p:nvSpPr>
+          <p:cNvPr id="4" name="Slide Number Placeholder 3"/>
+          <p:cNvSpPr>
+            <a:spLocks noGrp="1"/>
+          </p:cNvSpPr>
+          <p:nvPr>
+            <p:ph type="sldNum" sz="quarter" idx="10"/>
+          </p:nvPr>
+        </p:nvSpPr>
+        <p:spPr/>
+        <p:txBody>
+          <a:bodyPr/>
+          <a:lstStyle/>
+          <a:p>
+            <a:fld id="{DD1B326B-FBB1-FA4E-9C02-8753E795E64A}" type="slidenum">
+              <a:rPr lang="en-US" smtClean="0"/>
+              <a:t>14</a:t>
+            </a:fld>
+            <a:endParaRPr lang="en-US"/>
+          </a:p>
+        </p:txBody>
+      </p:sp>
+    </p:spTree>
+    <p:extLst>
+      <p:ext uri="{BB962C8B-B14F-4D97-AF65-F5344CB8AC3E}">
+        <p14:creationId xmlns:p14="http://schemas.microsoft.com/office/powerpoint/2010/main" val="3689993514"/>
+      </p:ext>
+    </p:extLst>
+  </p:cSld>
+  <p:clrMapOvr>
+    <a:masterClrMapping/>
+  </p:clrMapOvr>
+</p:notes>
+</file>
+
+<file path=ppt/notesSlides/notesSlide7.xml><?xml version="1.0" encoding="utf-8"?>
+<p:notes xmlns:a="http://schemas.openxmlformats.org/drawingml/2006/main" xmlns:r="http://schemas.openxmlformats.org/officeDocument/2006/relationships" xmlns:p="http://schemas.openxmlformats.org/presentationml/2006/main">
+  <p:cSld>
+    <p:spTree>
+      <p:nvGrpSpPr>
+        <p:cNvPr id="1" name=""/>
+        <p:cNvGrpSpPr/>
+        <p:nvPr/>
+      </p:nvGrpSpPr>
+      <p:grpSpPr>
+        <a:xfrm>
+          <a:off x="0" y="0"/>
+          <a:ext cx="0" cy="0"/>
+          <a:chOff x="0" y="0"/>
+          <a:chExt cx="0" cy="0"/>
+        </a:xfrm>
+      </p:grpSpPr>
+      <p:sp>
+        <p:nvSpPr>
+          <p:cNvPr id="2" name="Slide Image Placeholder 1"/>
+          <p:cNvSpPr>
+            <a:spLocks noGrp="1" noRot="1" noChangeAspect="1"/>
+          </p:cNvSpPr>
+          <p:nvPr>
+            <p:ph type="sldImg"/>
+          </p:nvPr>
+        </p:nvSpPr>
+        <p:spPr/>
+      </p:sp>
+      <p:sp>
+        <p:nvSpPr>
+          <p:cNvPr id="3" name="Notes Placeholder 2"/>
+          <p:cNvSpPr>
+            <a:spLocks noGrp="1"/>
+          </p:cNvSpPr>
+          <p:nvPr>
+            <p:ph type="body" idx="1"/>
+          </p:nvPr>
+        </p:nvSpPr>
+        <p:spPr/>
+        <p:txBody>
+          <a:bodyPr/>
+          <a:lstStyle/>
+          <a:p>
+            <a:endParaRPr lang="en-US" dirty="0"/>
+          </a:p>
+        </p:txBody>
+      </p:sp>
+      <p:sp>
+        <p:nvSpPr>
+          <p:cNvPr id="4" name="Slide Number Placeholder 3"/>
+          <p:cNvSpPr>
+            <a:spLocks noGrp="1"/>
+          </p:cNvSpPr>
+          <p:nvPr>
+            <p:ph type="sldNum" sz="quarter" idx="10"/>
+          </p:nvPr>
+        </p:nvSpPr>
+        <p:spPr/>
+        <p:txBody>
+          <a:bodyPr/>
+          <a:lstStyle/>
+          <a:p>
+            <a:fld id="{DD1B326B-FBB1-FA4E-9C02-8753E795E64A}" type="slidenum">
+              <a:rPr lang="en-US" smtClean="0"/>
+              <a:t>22</a:t>
+            </a:fld>
+            <a:endParaRPr lang="en-US"/>
+          </a:p>
+        </p:txBody>
+      </p:sp>
+    </p:spTree>
+    <p:extLst>
+      <p:ext uri="{BB962C8B-B14F-4D97-AF65-F5344CB8AC3E}">
+        <p14:creationId xmlns:p14="http://schemas.microsoft.com/office/powerpoint/2010/main" val="2081004225"/>
+      </p:ext>
+    </p:extLst>
+  </p:cSld>
+  <p:clrMapOvr>
+    <a:masterClrMapping/>
+  </p:clrMapOvr>
+</p:notes>
+</file>
+
+<file path=ppt/notesSlides/notesSlide8.xml><?xml version="1.0" encoding="utf-8"?>
+<p:notes xmlns:a="http://schemas.openxmlformats.org/drawingml/2006/main" xmlns:r="http://schemas.openxmlformats.org/officeDocument/2006/relationships" xmlns:p="http://schemas.openxmlformats.org/presentationml/2006/main">
+  <p:cSld>
+    <p:spTree>
+      <p:nvGrpSpPr>
+        <p:cNvPr id="1" name=""/>
+        <p:cNvGrpSpPr/>
+        <p:nvPr/>
+      </p:nvGrpSpPr>
+      <p:grpSpPr>
+        <a:xfrm>
+          <a:off x="0" y="0"/>
+          <a:ext cx="0" cy="0"/>
+          <a:chOff x="0" y="0"/>
+          <a:chExt cx="0" cy="0"/>
+        </a:xfrm>
+      </p:grpSpPr>
+      <p:sp>
+        <p:nvSpPr>
+          <p:cNvPr id="2" name="Slide Image Placeholder 1"/>
+          <p:cNvSpPr>
+            <a:spLocks noGrp="1" noRot="1" noChangeAspect="1"/>
+          </p:cNvSpPr>
+          <p:nvPr>
+            <p:ph type="sldImg"/>
+          </p:nvPr>
+        </p:nvSpPr>
+        <p:spPr/>
+      </p:sp>
+      <p:sp>
+        <p:nvSpPr>
+          <p:cNvPr id="3" name="Notes Placeholder 2"/>
+          <p:cNvSpPr>
+            <a:spLocks noGrp="1"/>
+          </p:cNvSpPr>
+          <p:nvPr>
+            <p:ph type="body" idx="1"/>
+          </p:nvPr>
+        </p:nvSpPr>
+        <p:spPr/>
+        <p:txBody>
+          <a:bodyPr/>
+          <a:lstStyle/>
+          <a:p>
+            <a:r>
+              <a:rPr lang="en-US" dirty="0" smtClean="0"/>
+              <a:t>Note that this</a:t>
+            </a:r>
+            <a:r>
+              <a:rPr lang="en-US" baseline="0" dirty="0" smtClean="0"/>
+              <a:t> activity diagram does not strictly adhere to BPMN/UML notation – mostly because we found the notation unnecessarily formal for our purposes.  Also note that these represent 3 separate diagrams linked together, and are not representing swim lanes</a:t>
+            </a:r>
+            <a:endParaRPr lang="en-US" dirty="0"/>
+          </a:p>
+        </p:txBody>
+      </p:sp>
+      <p:sp>
+        <p:nvSpPr>
+          <p:cNvPr id="4" name="Slide Number Placeholder 3"/>
+          <p:cNvSpPr>
+            <a:spLocks noGrp="1"/>
+          </p:cNvSpPr>
+          <p:nvPr>
+            <p:ph type="sldNum" sz="quarter" idx="10"/>
+          </p:nvPr>
+        </p:nvSpPr>
+        <p:spPr/>
+        <p:txBody>
+          <a:bodyPr/>
+          <a:lstStyle/>
+          <a:p>
+            <a:fld id="{DD1B326B-FBB1-FA4E-9C02-8753E795E64A}" type="slidenum">
+              <a:rPr lang="en-US" smtClean="0"/>
+              <a:t>25</a:t>
+            </a:fld>
+            <a:endParaRPr lang="en-US"/>
+          </a:p>
+        </p:txBody>
+      </p:sp>
+    </p:spTree>
+    <p:extLst>
+      <p:ext uri="{BB962C8B-B14F-4D97-AF65-F5344CB8AC3E}">
+        <p14:creationId xmlns:p14="http://schemas.microsoft.com/office/powerpoint/2010/main" val="2812244294"/>
       </p:ext>
     </p:extLst>
   </p:cSld>
@@ -736,7 +1431,7 @@
           <a:p>
             <a:fld id="{9D6228D5-5F93-BB4A-964B-203967C46295}" type="datetimeFigureOut">
               <a:rPr lang="en-US" smtClean="0"/>
-              <a:t>2/9/15</a:t>
+              <a:t>2/15/15</a:t>
             </a:fld>
             <a:endParaRPr lang="en-US"/>
           </a:p>
@@ -906,7 +1601,7 @@
           <a:p>
             <a:fld id="{9D6228D5-5F93-BB4A-964B-203967C46295}" type="datetimeFigureOut">
               <a:rPr lang="en-US" smtClean="0"/>
-              <a:t>2/9/15</a:t>
+              <a:t>2/15/15</a:t>
             </a:fld>
             <a:endParaRPr lang="en-US"/>
           </a:p>
@@ -1086,7 +1781,7 @@
           <a:p>
             <a:fld id="{9D6228D5-5F93-BB4A-964B-203967C46295}" type="datetimeFigureOut">
               <a:rPr lang="en-US" smtClean="0"/>
-              <a:t>2/9/15</a:t>
+              <a:t>2/15/15</a:t>
             </a:fld>
             <a:endParaRPr lang="en-US"/>
           </a:p>
@@ -1256,7 +1951,7 @@
           <a:p>
             <a:fld id="{9D6228D5-5F93-BB4A-964B-203967C46295}" type="datetimeFigureOut">
               <a:rPr lang="en-US" smtClean="0"/>
-              <a:t>2/9/15</a:t>
+              <a:t>2/15/15</a:t>
             </a:fld>
             <a:endParaRPr lang="en-US"/>
           </a:p>
@@ -1502,7 +2197,7 @@
           <a:p>
             <a:fld id="{9D6228D5-5F93-BB4A-964B-203967C46295}" type="datetimeFigureOut">
               <a:rPr lang="en-US" smtClean="0"/>
-              <a:t>2/9/15</a:t>
+              <a:t>2/15/15</a:t>
             </a:fld>
             <a:endParaRPr lang="en-US"/>
           </a:p>
@@ -1790,7 +2485,7 @@
           <a:p>
             <a:fld id="{9D6228D5-5F93-BB4A-964B-203967C46295}" type="datetimeFigureOut">
               <a:rPr lang="en-US" smtClean="0"/>
-              <a:t>2/9/15</a:t>
+              <a:t>2/15/15</a:t>
             </a:fld>
             <a:endParaRPr lang="en-US"/>
           </a:p>
@@ -2212,7 +2907,7 @@
           <a:p>
             <a:fld id="{9D6228D5-5F93-BB4A-964B-203967C46295}" type="datetimeFigureOut">
               <a:rPr lang="en-US" smtClean="0"/>
-              <a:t>2/9/15</a:t>
+              <a:t>2/15/15</a:t>
             </a:fld>
             <a:endParaRPr lang="en-US"/>
           </a:p>
@@ -2330,7 +3025,7 @@
           <a:p>
             <a:fld id="{9D6228D5-5F93-BB4A-964B-203967C46295}" type="datetimeFigureOut">
               <a:rPr lang="en-US" smtClean="0"/>
-              <a:t>2/9/15</a:t>
+              <a:t>2/15/15</a:t>
             </a:fld>
             <a:endParaRPr lang="en-US"/>
           </a:p>
@@ -2425,7 +3120,7 @@
           <a:p>
             <a:fld id="{9D6228D5-5F93-BB4A-964B-203967C46295}" type="datetimeFigureOut">
               <a:rPr lang="en-US" smtClean="0"/>
-              <a:t>2/9/15</a:t>
+              <a:t>2/15/15</a:t>
             </a:fld>
             <a:endParaRPr lang="en-US"/>
           </a:p>
@@ -2702,7 +3397,7 @@
           <a:p>
             <a:fld id="{9D6228D5-5F93-BB4A-964B-203967C46295}" type="datetimeFigureOut">
               <a:rPr lang="en-US" smtClean="0"/>
-              <a:t>2/9/15</a:t>
+              <a:t>2/15/15</a:t>
             </a:fld>
             <a:endParaRPr lang="en-US"/>
           </a:p>
@@ -2959,7 +3654,7 @@
           <a:p>
             <a:fld id="{9D6228D5-5F93-BB4A-964B-203967C46295}" type="datetimeFigureOut">
               <a:rPr lang="en-US" smtClean="0"/>
-              <a:t>2/9/15</a:t>
+              <a:t>2/15/15</a:t>
             </a:fld>
             <a:endParaRPr lang="en-US"/>
           </a:p>
@@ -3172,7 +3867,7 @@
           <a:p>
             <a:fld id="{9D6228D5-5F93-BB4A-964B-203967C46295}" type="datetimeFigureOut">
               <a:rPr lang="en-US" smtClean="0"/>
-              <a:t>2/9/15</a:t>
+              <a:t>2/15/15</a:t>
             </a:fld>
             <a:endParaRPr lang="en-US"/>
           </a:p>
@@ -3589,12 +4284,21 @@
         </p:nvSpPr>
         <p:spPr/>
         <p:txBody>
-          <a:bodyPr/>
-          <a:lstStyle/>
-          <a:p>
-            <a:r>
-              <a:rPr lang="en-US" dirty="0" smtClean="0"/>
-              <a:t>Lab 3</a:t>
+          <a:bodyPr>
+            <a:normAutofit fontScale="90000"/>
+          </a:bodyPr>
+          <a:lstStyle/>
+          <a:p>
+            <a:r>
+              <a:rPr lang="en-US" dirty="0"/>
+              <a:t>Systems Analysis for Data Curation</a:t>
+            </a:r>
+            <a:br>
+              <a:rPr lang="en-US" dirty="0"/>
+            </a:br>
+            <a:r>
+              <a:rPr lang="en-US" dirty="0" smtClean="0"/>
+              <a:t/>
             </a:r>
             <a:br>
               <a:rPr lang="en-US" dirty="0" smtClean="0"/>
@@ -3618,7 +4322,11 @@
           <a:bodyPr/>
           <a:lstStyle/>
           <a:p>
-            <a:endParaRPr lang="en-US"/>
+            <a:r>
+              <a:rPr lang="en-US" dirty="0"/>
+              <a:t>Lab 3</a:t>
+            </a:r>
+            <a:endParaRPr lang="en-US" dirty="0"/>
           </a:p>
         </p:txBody>
       </p:sp>
@@ -3626,6 +4334,1185 @@
     <p:extLst>
       <p:ext uri="{BB962C8B-B14F-4D97-AF65-F5344CB8AC3E}">
         <p14:creationId xmlns:p14="http://schemas.microsoft.com/office/powerpoint/2010/main" val="954281701"/>
+      </p:ext>
+    </p:extLst>
+  </p:cSld>
+  <p:clrMapOvr>
+    <a:masterClrMapping/>
+  </p:clrMapOvr>
+</p:sld>
+</file>
+
+<file path=ppt/slides/slide10.xml><?xml version="1.0" encoding="utf-8"?>
+<p:sld xmlns:a="http://schemas.openxmlformats.org/drawingml/2006/main" xmlns:r="http://schemas.openxmlformats.org/officeDocument/2006/relationships" xmlns:p="http://schemas.openxmlformats.org/presentationml/2006/main">
+  <p:cSld>
+    <p:spTree>
+      <p:nvGrpSpPr>
+        <p:cNvPr id="1" name=""/>
+        <p:cNvGrpSpPr/>
+        <p:nvPr/>
+      </p:nvGrpSpPr>
+      <p:grpSpPr>
+        <a:xfrm>
+          <a:off x="0" y="0"/>
+          <a:ext cx="0" cy="0"/>
+          <a:chOff x="0" y="0"/>
+          <a:chExt cx="0" cy="0"/>
+        </a:xfrm>
+      </p:grpSpPr>
+      <p:sp>
+        <p:nvSpPr>
+          <p:cNvPr id="2" name="Title 1"/>
+          <p:cNvSpPr>
+            <a:spLocks noGrp="1"/>
+          </p:cNvSpPr>
+          <p:nvPr>
+            <p:ph type="title"/>
+          </p:nvPr>
+        </p:nvSpPr>
+        <p:spPr/>
+        <p:txBody>
+          <a:bodyPr/>
+          <a:lstStyle/>
+          <a:p>
+            <a:r>
+              <a:rPr lang="en-US" dirty="0" smtClean="0"/>
+              <a:t>Formal Systems Analysis</a:t>
+            </a:r>
+            <a:endParaRPr lang="en-US" dirty="0"/>
+          </a:p>
+        </p:txBody>
+      </p:sp>
+      <p:sp>
+        <p:nvSpPr>
+          <p:cNvPr id="3" name="Content Placeholder 2"/>
+          <p:cNvSpPr>
+            <a:spLocks noGrp="1"/>
+          </p:cNvSpPr>
+          <p:nvPr>
+            <p:ph idx="1"/>
+          </p:nvPr>
+        </p:nvSpPr>
+        <p:spPr>
+          <a:xfrm>
+            <a:off x="457200" y="1600200"/>
+            <a:ext cx="8229600" cy="4228061"/>
+          </a:xfrm>
+        </p:spPr>
+        <p:txBody>
+          <a:bodyPr>
+            <a:normAutofit fontScale="92500" lnSpcReduction="10000"/>
+          </a:bodyPr>
+          <a:lstStyle/>
+          <a:p>
+            <a:r>
+              <a:rPr lang="en-US" dirty="0" smtClean="0"/>
+              <a:t>Requirements engineering (gathering)</a:t>
+            </a:r>
+          </a:p>
+          <a:p>
+            <a:r>
+              <a:rPr lang="en-US" dirty="0" smtClean="0"/>
+              <a:t>Use Case Modeling</a:t>
+            </a:r>
+          </a:p>
+          <a:p>
+            <a:r>
+              <a:rPr lang="en-US" dirty="0" smtClean="0"/>
+              <a:t>Activity Diagramming </a:t>
+            </a:r>
+          </a:p>
+          <a:p>
+            <a:r>
+              <a:rPr lang="en-US" dirty="0" smtClean="0">
+                <a:solidFill>
+                  <a:schemeClr val="bg1">
+                    <a:lumMod val="65000"/>
+                  </a:schemeClr>
+                </a:solidFill>
+              </a:rPr>
+              <a:t>Data Dictionary + Metadata Development</a:t>
+            </a:r>
+          </a:p>
+          <a:p>
+            <a:r>
+              <a:rPr lang="en-US" dirty="0" smtClean="0">
+                <a:solidFill>
+                  <a:schemeClr val="bg1">
+                    <a:lumMod val="65000"/>
+                  </a:schemeClr>
+                </a:solidFill>
+              </a:rPr>
+              <a:t>Prototyping System</a:t>
+            </a:r>
+          </a:p>
+          <a:p>
+            <a:r>
+              <a:rPr lang="en-US" dirty="0" smtClean="0">
+                <a:solidFill>
+                  <a:schemeClr val="bg1">
+                    <a:lumMod val="65000"/>
+                  </a:schemeClr>
+                </a:solidFill>
+              </a:rPr>
+              <a:t>Designing and Developing System</a:t>
+            </a:r>
+          </a:p>
+          <a:p>
+            <a:r>
+              <a:rPr lang="en-US" dirty="0" smtClean="0">
+                <a:solidFill>
+                  <a:schemeClr val="bg1">
+                    <a:lumMod val="65000"/>
+                  </a:schemeClr>
+                </a:solidFill>
+              </a:rPr>
+              <a:t>Implementation</a:t>
+            </a:r>
+          </a:p>
+          <a:p>
+            <a:r>
+              <a:rPr lang="en-US" dirty="0" smtClean="0">
+                <a:solidFill>
+                  <a:schemeClr val="bg1">
+                    <a:lumMod val="65000"/>
+                  </a:schemeClr>
+                </a:solidFill>
+              </a:rPr>
+              <a:t>Evaluation (Formative vs. Summative) </a:t>
+            </a:r>
+          </a:p>
+          <a:p>
+            <a:endParaRPr lang="en-US" dirty="0"/>
+          </a:p>
+        </p:txBody>
+      </p:sp>
+    </p:spTree>
+    <p:extLst>
+      <p:ext uri="{BB962C8B-B14F-4D97-AF65-F5344CB8AC3E}">
+        <p14:creationId xmlns:p14="http://schemas.microsoft.com/office/powerpoint/2010/main" val="2157989496"/>
+      </p:ext>
+    </p:extLst>
+  </p:cSld>
+  <p:clrMapOvr>
+    <a:masterClrMapping/>
+  </p:clrMapOvr>
+</p:sld>
+</file>
+
+<file path=ppt/slides/slide11.xml><?xml version="1.0" encoding="utf-8"?>
+<p:sld xmlns:a="http://schemas.openxmlformats.org/drawingml/2006/main" xmlns:r="http://schemas.openxmlformats.org/officeDocument/2006/relationships" xmlns:p="http://schemas.openxmlformats.org/presentationml/2006/main">
+  <p:cSld>
+    <p:spTree>
+      <p:nvGrpSpPr>
+        <p:cNvPr id="1" name=""/>
+        <p:cNvGrpSpPr/>
+        <p:nvPr/>
+      </p:nvGrpSpPr>
+      <p:grpSpPr>
+        <a:xfrm>
+          <a:off x="0" y="0"/>
+          <a:ext cx="0" cy="0"/>
+          <a:chOff x="0" y="0"/>
+          <a:chExt cx="0" cy="0"/>
+        </a:xfrm>
+      </p:grpSpPr>
+      <p:sp>
+        <p:nvSpPr>
+          <p:cNvPr id="3" name="Content Placeholder 2"/>
+          <p:cNvSpPr>
+            <a:spLocks noGrp="1"/>
+          </p:cNvSpPr>
+          <p:nvPr>
+            <p:ph idx="1"/>
+          </p:nvPr>
+        </p:nvSpPr>
+        <p:spPr>
+          <a:xfrm>
+            <a:off x="457200" y="935470"/>
+            <a:ext cx="8229600" cy="4525963"/>
+          </a:xfrm>
+        </p:spPr>
+        <p:txBody>
+          <a:bodyPr/>
+          <a:lstStyle/>
+          <a:p>
+            <a:pPr marL="0" indent="0">
+              <a:buNone/>
+            </a:pPr>
+            <a:r>
+              <a:rPr lang="en-US" dirty="0" smtClean="0"/>
+              <a:t>All engineering is a tradeoff between:</a:t>
+            </a:r>
+          </a:p>
+          <a:p>
+            <a:pPr marL="0" indent="0">
+              <a:buNone/>
+            </a:pPr>
+            <a:endParaRPr lang="en-US" dirty="0" smtClean="0"/>
+          </a:p>
+          <a:p>
+            <a:pPr lvl="1"/>
+            <a:r>
+              <a:rPr lang="en-US" dirty="0"/>
+              <a:t>F</a:t>
+            </a:r>
+            <a:r>
+              <a:rPr lang="en-US" dirty="0" smtClean="0"/>
+              <a:t>ormal and rigorous</a:t>
+            </a:r>
+          </a:p>
+          <a:p>
+            <a:pPr lvl="2"/>
+            <a:r>
+              <a:rPr lang="en-US" dirty="0" smtClean="0"/>
+              <a:t>UML diagrams that map onto specific database structures</a:t>
+            </a:r>
+          </a:p>
+          <a:p>
+            <a:pPr lvl="2"/>
+            <a:endParaRPr lang="en-US" dirty="0" smtClean="0"/>
+          </a:p>
+          <a:p>
+            <a:pPr lvl="1"/>
+            <a:r>
+              <a:rPr lang="en-US" dirty="0" smtClean="0"/>
+              <a:t>Informal and opportunistic</a:t>
+            </a:r>
+          </a:p>
+          <a:p>
+            <a:pPr lvl="2"/>
+            <a:r>
+              <a:rPr lang="en-US" dirty="0" smtClean="0"/>
+              <a:t>Activity diagrams that model processes at high levels</a:t>
+            </a:r>
+          </a:p>
+        </p:txBody>
+      </p:sp>
+    </p:spTree>
+    <p:extLst>
+      <p:ext uri="{BB962C8B-B14F-4D97-AF65-F5344CB8AC3E}">
+        <p14:creationId xmlns:p14="http://schemas.microsoft.com/office/powerpoint/2010/main" val="3076766597"/>
+      </p:ext>
+    </p:extLst>
+  </p:cSld>
+  <p:clrMapOvr>
+    <a:masterClrMapping/>
+  </p:clrMapOvr>
+</p:sld>
+</file>
+
+<file path=ppt/slides/slide12.xml><?xml version="1.0" encoding="utf-8"?>
+<p:sld xmlns:a="http://schemas.openxmlformats.org/drawingml/2006/main" xmlns:r="http://schemas.openxmlformats.org/officeDocument/2006/relationships" xmlns:p="http://schemas.openxmlformats.org/presentationml/2006/main">
+  <p:cSld>
+    <p:spTree>
+      <p:nvGrpSpPr>
+        <p:cNvPr id="1" name=""/>
+        <p:cNvGrpSpPr/>
+        <p:nvPr/>
+      </p:nvGrpSpPr>
+      <p:grpSpPr>
+        <a:xfrm>
+          <a:off x="0" y="0"/>
+          <a:ext cx="0" cy="0"/>
+          <a:chOff x="0" y="0"/>
+          <a:chExt cx="0" cy="0"/>
+        </a:xfrm>
+      </p:grpSpPr>
+      <p:sp>
+        <p:nvSpPr>
+          <p:cNvPr id="2" name="Title 1"/>
+          <p:cNvSpPr>
+            <a:spLocks noGrp="1"/>
+          </p:cNvSpPr>
+          <p:nvPr>
+            <p:ph type="title"/>
+          </p:nvPr>
+        </p:nvSpPr>
+        <p:spPr/>
+        <p:txBody>
+          <a:bodyPr/>
+          <a:lstStyle/>
+          <a:p>
+            <a:r>
+              <a:rPr lang="en-US" dirty="0" smtClean="0"/>
+              <a:t>Requirements Gathering</a:t>
+            </a:r>
+            <a:endParaRPr lang="en-US" dirty="0"/>
+          </a:p>
+        </p:txBody>
+      </p:sp>
+      <p:sp>
+        <p:nvSpPr>
+          <p:cNvPr id="3" name="Content Placeholder 2"/>
+          <p:cNvSpPr>
+            <a:spLocks noGrp="1"/>
+          </p:cNvSpPr>
+          <p:nvPr>
+            <p:ph idx="1"/>
+          </p:nvPr>
+        </p:nvSpPr>
+        <p:spPr/>
+        <p:txBody>
+          <a:bodyPr/>
+          <a:lstStyle/>
+          <a:p>
+            <a:r>
+              <a:rPr lang="en-US" dirty="0" smtClean="0"/>
+              <a:t>Interviews</a:t>
+            </a:r>
+          </a:p>
+          <a:p>
+            <a:r>
+              <a:rPr lang="en-US" dirty="0" smtClean="0"/>
+              <a:t>Questionnaires (Surveys)</a:t>
+            </a:r>
+          </a:p>
+          <a:p>
+            <a:r>
+              <a:rPr lang="en-US" dirty="0" smtClean="0"/>
+              <a:t>Ethnography / Observation</a:t>
+            </a:r>
+          </a:p>
+          <a:p>
+            <a:r>
+              <a:rPr lang="en-US" dirty="0" smtClean="0"/>
+              <a:t>Thorough literature review</a:t>
+            </a:r>
+          </a:p>
+          <a:p>
+            <a:r>
+              <a:rPr lang="en-US" dirty="0"/>
+              <a:t>Joint Application Design</a:t>
+            </a:r>
+          </a:p>
+          <a:p>
+            <a:endParaRPr lang="en-US" dirty="0"/>
+          </a:p>
+        </p:txBody>
+      </p:sp>
+    </p:spTree>
+    <p:extLst>
+      <p:ext uri="{BB962C8B-B14F-4D97-AF65-F5344CB8AC3E}">
+        <p14:creationId xmlns:p14="http://schemas.microsoft.com/office/powerpoint/2010/main" val="2672088673"/>
+      </p:ext>
+    </p:extLst>
+  </p:cSld>
+  <p:clrMapOvr>
+    <a:masterClrMapping/>
+  </p:clrMapOvr>
+</p:sld>
+</file>
+
+<file path=ppt/slides/slide13.xml><?xml version="1.0" encoding="utf-8"?>
+<p:sld xmlns:a="http://schemas.openxmlformats.org/drawingml/2006/main" xmlns:r="http://schemas.openxmlformats.org/officeDocument/2006/relationships" xmlns:p="http://schemas.openxmlformats.org/presentationml/2006/main">
+  <p:cSld>
+    <p:spTree>
+      <p:nvGrpSpPr>
+        <p:cNvPr id="1" name=""/>
+        <p:cNvGrpSpPr/>
+        <p:nvPr/>
+      </p:nvGrpSpPr>
+      <p:grpSpPr>
+        <a:xfrm>
+          <a:off x="0" y="0"/>
+          <a:ext cx="0" cy="0"/>
+          <a:chOff x="0" y="0"/>
+          <a:chExt cx="0" cy="0"/>
+        </a:xfrm>
+      </p:grpSpPr>
+      <p:sp>
+        <p:nvSpPr>
+          <p:cNvPr id="2" name="Title 1"/>
+          <p:cNvSpPr>
+            <a:spLocks noGrp="1"/>
+          </p:cNvSpPr>
+          <p:nvPr>
+            <p:ph type="title"/>
+          </p:nvPr>
+        </p:nvSpPr>
+        <p:spPr/>
+        <p:txBody>
+          <a:bodyPr>
+            <a:normAutofit fontScale="90000"/>
+          </a:bodyPr>
+          <a:lstStyle/>
+          <a:p>
+            <a:r>
+              <a:rPr lang="en-US" dirty="0" smtClean="0"/>
+              <a:t>Interview and Interaction Strategies</a:t>
+            </a:r>
+            <a:endParaRPr lang="en-US" dirty="0"/>
+          </a:p>
+        </p:txBody>
+      </p:sp>
+      <p:sp>
+        <p:nvSpPr>
+          <p:cNvPr id="3" name="Content Placeholder 2"/>
+          <p:cNvSpPr>
+            <a:spLocks noGrp="1"/>
+          </p:cNvSpPr>
+          <p:nvPr>
+            <p:ph idx="1"/>
+          </p:nvPr>
+        </p:nvSpPr>
+        <p:spPr/>
+        <p:txBody>
+          <a:bodyPr/>
+          <a:lstStyle/>
+          <a:p>
+            <a:r>
+              <a:rPr lang="en-US" dirty="0" smtClean="0"/>
+              <a:t>Avoid open ended questions early</a:t>
+            </a:r>
+          </a:p>
+          <a:p>
+            <a:r>
+              <a:rPr lang="en-US" dirty="0" smtClean="0"/>
+              <a:t>Avoid generic comparisons</a:t>
+            </a:r>
+          </a:p>
+          <a:p>
+            <a:pPr lvl="1"/>
+            <a:r>
+              <a:rPr lang="en-US" dirty="0" smtClean="0"/>
+              <a:t>Q “What kind of system do you want?”</a:t>
+            </a:r>
+          </a:p>
+          <a:p>
+            <a:pPr lvl="1"/>
+            <a:r>
+              <a:rPr lang="en-US" dirty="0" smtClean="0"/>
+              <a:t>A “Search of Google, Social networking of </a:t>
+            </a:r>
+            <a:r>
+              <a:rPr lang="en-US" dirty="0" err="1" smtClean="0"/>
+              <a:t>facebook</a:t>
+            </a:r>
+            <a:r>
+              <a:rPr lang="en-US" dirty="0" smtClean="0"/>
+              <a:t>”</a:t>
+            </a:r>
+            <a:endParaRPr lang="en-US" dirty="0"/>
+          </a:p>
+        </p:txBody>
+      </p:sp>
+    </p:spTree>
+    <p:extLst>
+      <p:ext uri="{BB962C8B-B14F-4D97-AF65-F5344CB8AC3E}">
+        <p14:creationId xmlns:p14="http://schemas.microsoft.com/office/powerpoint/2010/main" val="3459634866"/>
+      </p:ext>
+    </p:extLst>
+  </p:cSld>
+  <p:clrMapOvr>
+    <a:masterClrMapping/>
+  </p:clrMapOvr>
+</p:sld>
+</file>
+
+<file path=ppt/slides/slide14.xml><?xml version="1.0" encoding="utf-8"?>
+<p:sld xmlns:a="http://schemas.openxmlformats.org/drawingml/2006/main" xmlns:r="http://schemas.openxmlformats.org/officeDocument/2006/relationships" xmlns:p="http://schemas.openxmlformats.org/presentationml/2006/main">
+  <p:cSld>
+    <p:spTree>
+      <p:nvGrpSpPr>
+        <p:cNvPr id="1" name=""/>
+        <p:cNvGrpSpPr/>
+        <p:nvPr/>
+      </p:nvGrpSpPr>
+      <p:grpSpPr>
+        <a:xfrm>
+          <a:off x="0" y="0"/>
+          <a:ext cx="0" cy="0"/>
+          <a:chOff x="0" y="0"/>
+          <a:chExt cx="0" cy="0"/>
+        </a:xfrm>
+      </p:grpSpPr>
+      <p:sp>
+        <p:nvSpPr>
+          <p:cNvPr id="2" name="Title 1"/>
+          <p:cNvSpPr>
+            <a:spLocks noGrp="1"/>
+          </p:cNvSpPr>
+          <p:nvPr>
+            <p:ph type="title"/>
+          </p:nvPr>
+        </p:nvSpPr>
+        <p:spPr/>
+        <p:txBody>
+          <a:bodyPr>
+            <a:normAutofit/>
+          </a:bodyPr>
+          <a:lstStyle/>
+          <a:p>
+            <a:r>
+              <a:rPr lang="en-US" dirty="0" smtClean="0"/>
+              <a:t>JAD</a:t>
+            </a:r>
+            <a:endParaRPr lang="en-US" dirty="0"/>
+          </a:p>
+        </p:txBody>
+      </p:sp>
+      <p:sp>
+        <p:nvSpPr>
+          <p:cNvPr id="3" name="Content Placeholder 2"/>
+          <p:cNvSpPr>
+            <a:spLocks noGrp="1"/>
+          </p:cNvSpPr>
+          <p:nvPr>
+            <p:ph idx="1"/>
+          </p:nvPr>
+        </p:nvSpPr>
+        <p:spPr/>
+        <p:txBody>
+          <a:bodyPr/>
+          <a:lstStyle/>
+          <a:p>
+            <a:r>
+              <a:rPr lang="en-US" dirty="0" smtClean="0"/>
+              <a:t>Group process</a:t>
+            </a:r>
+          </a:p>
+          <a:p>
+            <a:pPr lvl="1"/>
+            <a:r>
+              <a:rPr lang="en-US" dirty="0" smtClean="0"/>
+              <a:t>Requires </a:t>
+            </a:r>
+          </a:p>
+          <a:p>
+            <a:pPr lvl="2"/>
+            <a:r>
+              <a:rPr lang="en-US" dirty="0" smtClean="0"/>
+              <a:t>champion of project</a:t>
+            </a:r>
+          </a:p>
+          <a:p>
+            <a:pPr lvl="2"/>
+            <a:r>
+              <a:rPr lang="en-US" dirty="0" smtClean="0"/>
+              <a:t>At least 3 potential users of system</a:t>
+            </a:r>
+          </a:p>
+          <a:p>
+            <a:pPr lvl="2"/>
+            <a:r>
+              <a:rPr lang="en-US" dirty="0" smtClean="0"/>
+              <a:t>Developers who will implement system (limited interaction)</a:t>
+            </a:r>
+          </a:p>
+          <a:p>
+            <a:pPr lvl="2"/>
+            <a:r>
+              <a:rPr lang="en-US" dirty="0" smtClean="0"/>
+              <a:t>Analyst</a:t>
+            </a:r>
+          </a:p>
+          <a:p>
+            <a:pPr lvl="2"/>
+            <a:r>
+              <a:rPr lang="en-US" dirty="0" smtClean="0"/>
+              <a:t>External Observer (lab manager)</a:t>
+            </a:r>
+          </a:p>
+          <a:p>
+            <a:pPr lvl="2"/>
+            <a:r>
+              <a:rPr lang="en-US" dirty="0" smtClean="0"/>
+              <a:t>Note-taker</a:t>
+            </a:r>
+          </a:p>
+          <a:p>
+            <a:pPr lvl="1"/>
+            <a:endParaRPr lang="en-US" dirty="0"/>
+          </a:p>
+        </p:txBody>
+      </p:sp>
+    </p:spTree>
+    <p:extLst>
+      <p:ext uri="{BB962C8B-B14F-4D97-AF65-F5344CB8AC3E}">
+        <p14:creationId xmlns:p14="http://schemas.microsoft.com/office/powerpoint/2010/main" val="1315347213"/>
+      </p:ext>
+    </p:extLst>
+  </p:cSld>
+  <p:clrMapOvr>
+    <a:masterClrMapping/>
+  </p:clrMapOvr>
+</p:sld>
+</file>
+
+<file path=ppt/slides/slide15.xml><?xml version="1.0" encoding="utf-8"?>
+<p:sld xmlns:a="http://schemas.openxmlformats.org/drawingml/2006/main" xmlns:r="http://schemas.openxmlformats.org/officeDocument/2006/relationships" xmlns:p="http://schemas.openxmlformats.org/presentationml/2006/main">
+  <p:cSld>
+    <p:spTree>
+      <p:nvGrpSpPr>
+        <p:cNvPr id="1" name=""/>
+        <p:cNvGrpSpPr/>
+        <p:nvPr/>
+      </p:nvGrpSpPr>
+      <p:grpSpPr>
+        <a:xfrm>
+          <a:off x="0" y="0"/>
+          <a:ext cx="0" cy="0"/>
+          <a:chOff x="0" y="0"/>
+          <a:chExt cx="0" cy="0"/>
+        </a:xfrm>
+      </p:grpSpPr>
+      <p:sp>
+        <p:nvSpPr>
+          <p:cNvPr id="2" name="Title 1"/>
+          <p:cNvSpPr>
+            <a:spLocks noGrp="1"/>
+          </p:cNvSpPr>
+          <p:nvPr>
+            <p:ph type="title"/>
+          </p:nvPr>
+        </p:nvSpPr>
+        <p:spPr/>
+        <p:txBody>
+          <a:bodyPr/>
+          <a:lstStyle/>
+          <a:p>
+            <a:r>
+              <a:rPr lang="en-US" dirty="0" smtClean="0"/>
+              <a:t>Requirements Gathering</a:t>
+            </a:r>
+            <a:endParaRPr lang="en-US" dirty="0"/>
+          </a:p>
+        </p:txBody>
+      </p:sp>
+      <p:sp>
+        <p:nvSpPr>
+          <p:cNvPr id="3" name="Content Placeholder 2"/>
+          <p:cNvSpPr>
+            <a:spLocks noGrp="1"/>
+          </p:cNvSpPr>
+          <p:nvPr>
+            <p:ph idx="1"/>
+          </p:nvPr>
+        </p:nvSpPr>
+        <p:spPr/>
+        <p:txBody>
+          <a:bodyPr/>
+          <a:lstStyle/>
+          <a:p>
+            <a:r>
+              <a:rPr lang="en-US" dirty="0" smtClean="0"/>
+              <a:t>Should produce </a:t>
+            </a:r>
+          </a:p>
+          <a:p>
+            <a:pPr lvl="1"/>
+            <a:r>
+              <a:rPr lang="en-US" dirty="0" smtClean="0"/>
+              <a:t>a range of needs and desires</a:t>
+            </a:r>
+          </a:p>
+          <a:p>
+            <a:pPr lvl="1"/>
+            <a:r>
+              <a:rPr lang="en-US" dirty="0" smtClean="0"/>
+              <a:t>Potential solutions</a:t>
+            </a:r>
+          </a:p>
+          <a:p>
+            <a:pPr lvl="1"/>
+            <a:r>
+              <a:rPr lang="en-US" dirty="0" smtClean="0"/>
+              <a:t>Time frame for achieving these solutions</a:t>
+            </a:r>
+          </a:p>
+          <a:p>
+            <a:pPr lvl="1"/>
+            <a:r>
+              <a:rPr lang="en-US" dirty="0" smtClean="0"/>
+              <a:t>A generic cost / benefit ratio for solution</a:t>
+            </a:r>
+          </a:p>
+          <a:p>
+            <a:pPr lvl="1"/>
+            <a:r>
+              <a:rPr lang="en-US" dirty="0" smtClean="0"/>
+              <a:t>Scheme for evaluation (define </a:t>
+            </a:r>
+          </a:p>
+          <a:p>
+            <a:pPr marL="0" indent="0">
+              <a:buNone/>
+            </a:pPr>
+            <a:endParaRPr lang="en-US" dirty="0"/>
+          </a:p>
+        </p:txBody>
+      </p:sp>
+    </p:spTree>
+    <p:extLst>
+      <p:ext uri="{BB962C8B-B14F-4D97-AF65-F5344CB8AC3E}">
+        <p14:creationId xmlns:p14="http://schemas.microsoft.com/office/powerpoint/2010/main" val="2210666670"/>
+      </p:ext>
+    </p:extLst>
+  </p:cSld>
+  <p:clrMapOvr>
+    <a:masterClrMapping/>
+  </p:clrMapOvr>
+</p:sld>
+</file>
+
+<file path=ppt/slides/slide16.xml><?xml version="1.0" encoding="utf-8"?>
+<p:sld xmlns:a="http://schemas.openxmlformats.org/drawingml/2006/main" xmlns:r="http://schemas.openxmlformats.org/officeDocument/2006/relationships" xmlns:p="http://schemas.openxmlformats.org/presentationml/2006/main">
+  <p:cSld>
+    <p:spTree>
+      <p:nvGrpSpPr>
+        <p:cNvPr id="1" name=""/>
+        <p:cNvGrpSpPr/>
+        <p:nvPr/>
+      </p:nvGrpSpPr>
+      <p:grpSpPr>
+        <a:xfrm>
+          <a:off x="0" y="0"/>
+          <a:ext cx="0" cy="0"/>
+          <a:chOff x="0" y="0"/>
+          <a:chExt cx="0" cy="0"/>
+        </a:xfrm>
+      </p:grpSpPr>
+      <p:sp>
+        <p:nvSpPr>
+          <p:cNvPr id="2" name="Title 1"/>
+          <p:cNvSpPr>
+            <a:spLocks noGrp="1"/>
+          </p:cNvSpPr>
+          <p:nvPr>
+            <p:ph type="title"/>
+          </p:nvPr>
+        </p:nvSpPr>
+        <p:spPr/>
+        <p:txBody>
+          <a:bodyPr/>
+          <a:lstStyle/>
+          <a:p>
+            <a:r>
+              <a:rPr lang="en-US" dirty="0" smtClean="0"/>
+              <a:t>Use Case : Basic Elements</a:t>
+            </a:r>
+            <a:endParaRPr lang="en-US" dirty="0"/>
+          </a:p>
+        </p:txBody>
+      </p:sp>
+      <p:sp>
+        <p:nvSpPr>
+          <p:cNvPr id="3" name="Content Placeholder 2"/>
+          <p:cNvSpPr>
+            <a:spLocks noGrp="1"/>
+          </p:cNvSpPr>
+          <p:nvPr>
+            <p:ph idx="1"/>
+          </p:nvPr>
+        </p:nvSpPr>
+        <p:spPr>
+          <a:xfrm>
+            <a:off x="457200" y="1839879"/>
+            <a:ext cx="8229600" cy="4286284"/>
+          </a:xfrm>
+        </p:spPr>
+        <p:txBody>
+          <a:bodyPr numCol="2"/>
+          <a:lstStyle/>
+          <a:p>
+            <a:pPr lvl="1"/>
+            <a:r>
+              <a:rPr lang="en-US" dirty="0" smtClean="0"/>
+              <a:t>Use case name</a:t>
+            </a:r>
+          </a:p>
+          <a:p>
+            <a:pPr lvl="2"/>
+            <a:r>
+              <a:rPr lang="en-US" dirty="0" smtClean="0"/>
+              <a:t>Description</a:t>
+            </a:r>
+          </a:p>
+          <a:p>
+            <a:pPr lvl="1"/>
+            <a:r>
+              <a:rPr lang="en-US" dirty="0" smtClean="0"/>
+              <a:t>Flow of events</a:t>
+            </a:r>
+          </a:p>
+          <a:p>
+            <a:pPr lvl="2"/>
+            <a:r>
+              <a:rPr lang="en-US" dirty="0" smtClean="0"/>
+              <a:t>Basic</a:t>
+            </a:r>
+          </a:p>
+          <a:p>
+            <a:pPr lvl="2"/>
+            <a:r>
+              <a:rPr lang="en-US" dirty="0" smtClean="0"/>
+              <a:t>Alternative</a:t>
+            </a:r>
+          </a:p>
+          <a:p>
+            <a:pPr lvl="2"/>
+            <a:endParaRPr lang="en-US" dirty="0"/>
+          </a:p>
+          <a:p>
+            <a:pPr lvl="2"/>
+            <a:endParaRPr lang="en-US" dirty="0" smtClean="0"/>
+          </a:p>
+          <a:p>
+            <a:pPr marL="914400" lvl="2" indent="0">
+              <a:buNone/>
+            </a:pPr>
+            <a:endParaRPr lang="en-US" dirty="0" smtClean="0"/>
+          </a:p>
+          <a:p>
+            <a:pPr marL="914400" lvl="2" indent="0">
+              <a:buNone/>
+            </a:pPr>
+            <a:endParaRPr lang="en-US" dirty="0" smtClean="0"/>
+          </a:p>
+          <a:p>
+            <a:pPr lvl="1"/>
+            <a:r>
+              <a:rPr lang="en-US" dirty="0" smtClean="0"/>
+              <a:t>Special Requirements</a:t>
+            </a:r>
+          </a:p>
+          <a:p>
+            <a:pPr lvl="1"/>
+            <a:r>
+              <a:rPr lang="en-US" dirty="0" smtClean="0"/>
+              <a:t>Pre Conditions</a:t>
+            </a:r>
+          </a:p>
+          <a:p>
+            <a:pPr lvl="1"/>
+            <a:r>
+              <a:rPr lang="en-US" dirty="0" smtClean="0"/>
+              <a:t>Post Conditions</a:t>
+            </a:r>
+          </a:p>
+          <a:p>
+            <a:pPr lvl="1"/>
+            <a:endParaRPr lang="en-US" dirty="0"/>
+          </a:p>
+        </p:txBody>
+      </p:sp>
+    </p:spTree>
+    <p:extLst>
+      <p:ext uri="{BB962C8B-B14F-4D97-AF65-F5344CB8AC3E}">
+        <p14:creationId xmlns:p14="http://schemas.microsoft.com/office/powerpoint/2010/main" val="1223244009"/>
+      </p:ext>
+    </p:extLst>
+  </p:cSld>
+  <p:clrMapOvr>
+    <a:masterClrMapping/>
+  </p:clrMapOvr>
+</p:sld>
+</file>
+
+<file path=ppt/slides/slide17.xml><?xml version="1.0" encoding="utf-8"?>
+<p:sld xmlns:a="http://schemas.openxmlformats.org/drawingml/2006/main" xmlns:r="http://schemas.openxmlformats.org/officeDocument/2006/relationships" xmlns:p="http://schemas.openxmlformats.org/presentationml/2006/main">
+  <p:cSld>
+    <p:spTree>
+      <p:nvGrpSpPr>
+        <p:cNvPr id="1" name=""/>
+        <p:cNvGrpSpPr/>
+        <p:nvPr/>
+      </p:nvGrpSpPr>
+      <p:grpSpPr>
+        <a:xfrm>
+          <a:off x="0" y="0"/>
+          <a:ext cx="0" cy="0"/>
+          <a:chOff x="0" y="0"/>
+          <a:chExt cx="0" cy="0"/>
+        </a:xfrm>
+      </p:grpSpPr>
+      <p:sp>
+        <p:nvSpPr>
+          <p:cNvPr id="2" name="Title 1"/>
+          <p:cNvSpPr>
+            <a:spLocks noGrp="1"/>
+          </p:cNvSpPr>
+          <p:nvPr>
+            <p:ph type="title"/>
+          </p:nvPr>
+        </p:nvSpPr>
+        <p:spPr/>
+        <p:txBody>
+          <a:bodyPr/>
+          <a:lstStyle/>
+          <a:p>
+            <a:r>
+              <a:rPr lang="en-US" dirty="0" smtClean="0"/>
+              <a:t>Use Case Template</a:t>
+            </a:r>
+            <a:endParaRPr lang="en-US" dirty="0"/>
+          </a:p>
+        </p:txBody>
+      </p:sp>
+      <p:sp>
+        <p:nvSpPr>
+          <p:cNvPr id="3" name="Content Placeholder 2"/>
+          <p:cNvSpPr>
+            <a:spLocks noGrp="1"/>
+          </p:cNvSpPr>
+          <p:nvPr>
+            <p:ph idx="1"/>
+          </p:nvPr>
+        </p:nvSpPr>
+        <p:spPr/>
+        <p:txBody>
+          <a:bodyPr/>
+          <a:lstStyle/>
+          <a:p>
+            <a:pPr marL="0" indent="0">
+              <a:buNone/>
+            </a:pPr>
+            <a:endParaRPr lang="en-US"/>
+          </a:p>
+        </p:txBody>
+      </p:sp>
+    </p:spTree>
+    <p:extLst>
+      <p:ext uri="{BB962C8B-B14F-4D97-AF65-F5344CB8AC3E}">
+        <p14:creationId xmlns:p14="http://schemas.microsoft.com/office/powerpoint/2010/main" val="1977707023"/>
+      </p:ext>
+    </p:extLst>
+  </p:cSld>
+  <p:clrMapOvr>
+    <a:masterClrMapping/>
+  </p:clrMapOvr>
+</p:sld>
+</file>
+
+<file path=ppt/slides/slide18.xml><?xml version="1.0" encoding="utf-8"?>
+<p:sld xmlns:a="http://schemas.openxmlformats.org/drawingml/2006/main" xmlns:r="http://schemas.openxmlformats.org/officeDocument/2006/relationships" xmlns:p="http://schemas.openxmlformats.org/presentationml/2006/main">
+  <p:cSld>
+    <p:spTree>
+      <p:nvGrpSpPr>
+        <p:cNvPr id="1" name=""/>
+        <p:cNvGrpSpPr/>
+        <p:nvPr/>
+      </p:nvGrpSpPr>
+      <p:grpSpPr>
+        <a:xfrm>
+          <a:off x="0" y="0"/>
+          <a:ext cx="0" cy="0"/>
+          <a:chOff x="0" y="0"/>
+          <a:chExt cx="0" cy="0"/>
+        </a:xfrm>
+      </p:grpSpPr>
+      <p:sp>
+        <p:nvSpPr>
+          <p:cNvPr id="2" name="Title 1"/>
+          <p:cNvSpPr>
+            <a:spLocks noGrp="1"/>
+          </p:cNvSpPr>
+          <p:nvPr>
+            <p:ph type="title"/>
+          </p:nvPr>
+        </p:nvSpPr>
+        <p:spPr/>
+        <p:txBody>
+          <a:bodyPr/>
+          <a:lstStyle/>
+          <a:p>
+            <a:r>
+              <a:rPr lang="en-US" dirty="0" smtClean="0"/>
+              <a:t>Definitions</a:t>
+            </a:r>
+            <a:endParaRPr lang="en-US" dirty="0"/>
+          </a:p>
+        </p:txBody>
+      </p:sp>
+      <p:sp>
+        <p:nvSpPr>
+          <p:cNvPr id="3" name="Content Placeholder 2"/>
+          <p:cNvSpPr>
+            <a:spLocks noGrp="1"/>
+          </p:cNvSpPr>
+          <p:nvPr>
+            <p:ph idx="1"/>
+          </p:nvPr>
+        </p:nvSpPr>
+        <p:spPr/>
+        <p:txBody>
+          <a:bodyPr>
+            <a:normAutofit/>
+          </a:bodyPr>
+          <a:lstStyle/>
+          <a:p>
+            <a:r>
+              <a:rPr lang="en-US" b="1" dirty="0" smtClean="0"/>
+              <a:t>Business Process</a:t>
+            </a:r>
+            <a:r>
+              <a:rPr lang="en-US" dirty="0" smtClean="0"/>
+              <a:t>: a collection of related, structured activities that produce a specific service or product</a:t>
+            </a:r>
+          </a:p>
+          <a:p>
+            <a:r>
+              <a:rPr lang="en-US" b="1" dirty="0" smtClean="0"/>
+              <a:t>Process modeling: </a:t>
+            </a:r>
+            <a:r>
+              <a:rPr lang="en-US" dirty="0" smtClean="0"/>
+              <a:t>the activity of representing the processes of an enterprise so they might be analyzed or improved</a:t>
+            </a:r>
+          </a:p>
+          <a:p>
+            <a:r>
+              <a:rPr lang="en-US" b="1" dirty="0" smtClean="0"/>
+              <a:t>Activity diagram</a:t>
+            </a:r>
+            <a:r>
+              <a:rPr lang="en-US" dirty="0" smtClean="0"/>
+              <a:t>: graphical representation of </a:t>
+            </a:r>
+            <a:r>
+              <a:rPr lang="en-US" dirty="0"/>
+              <a:t>activities </a:t>
+            </a:r>
+            <a:r>
+              <a:rPr lang="en-US" dirty="0" smtClean="0"/>
+              <a:t>and decisions in </a:t>
+            </a:r>
+            <a:r>
+              <a:rPr lang="en-US" dirty="0"/>
+              <a:t>a </a:t>
+            </a:r>
+            <a:r>
+              <a:rPr lang="en-US" dirty="0" smtClean="0"/>
+              <a:t>process</a:t>
+            </a:r>
+          </a:p>
+          <a:p>
+            <a:pPr marL="0" indent="0">
+              <a:buNone/>
+            </a:pPr>
+            <a:endParaRPr lang="en-US" dirty="0"/>
+          </a:p>
+          <a:p>
+            <a:endParaRPr lang="en-US" dirty="0"/>
+          </a:p>
+        </p:txBody>
+      </p:sp>
+    </p:spTree>
+    <p:extLst>
+      <p:ext uri="{BB962C8B-B14F-4D97-AF65-F5344CB8AC3E}">
+        <p14:creationId xmlns:p14="http://schemas.microsoft.com/office/powerpoint/2010/main" val="1884649387"/>
+      </p:ext>
+    </p:extLst>
+  </p:cSld>
+  <p:clrMapOvr>
+    <a:masterClrMapping/>
+  </p:clrMapOvr>
+</p:sld>
+</file>
+
+<file path=ppt/slides/slide19.xml><?xml version="1.0" encoding="utf-8"?>
+<p:sld xmlns:a="http://schemas.openxmlformats.org/drawingml/2006/main" xmlns:r="http://schemas.openxmlformats.org/officeDocument/2006/relationships" xmlns:p="http://schemas.openxmlformats.org/presentationml/2006/main">
+  <p:cSld>
+    <p:spTree>
+      <p:nvGrpSpPr>
+        <p:cNvPr id="1" name=""/>
+        <p:cNvGrpSpPr/>
+        <p:nvPr/>
+      </p:nvGrpSpPr>
+      <p:grpSpPr>
+        <a:xfrm>
+          <a:off x="0" y="0"/>
+          <a:ext cx="0" cy="0"/>
+          <a:chOff x="0" y="0"/>
+          <a:chExt cx="0" cy="0"/>
+        </a:xfrm>
+      </p:grpSpPr>
+      <p:sp>
+        <p:nvSpPr>
+          <p:cNvPr id="2" name="Title 1"/>
+          <p:cNvSpPr>
+            <a:spLocks noGrp="1"/>
+          </p:cNvSpPr>
+          <p:nvPr>
+            <p:ph type="title"/>
+          </p:nvPr>
+        </p:nvSpPr>
+        <p:spPr/>
+        <p:txBody>
+          <a:bodyPr/>
+          <a:lstStyle/>
+          <a:p>
+            <a:r>
+              <a:rPr lang="en-US" dirty="0" smtClean="0"/>
+              <a:t>Definitions</a:t>
+            </a:r>
+            <a:endParaRPr lang="en-US" dirty="0"/>
+          </a:p>
+        </p:txBody>
+      </p:sp>
+      <p:sp>
+        <p:nvSpPr>
+          <p:cNvPr id="3" name="Content Placeholder 2"/>
+          <p:cNvSpPr>
+            <a:spLocks noGrp="1"/>
+          </p:cNvSpPr>
+          <p:nvPr>
+            <p:ph idx="1"/>
+          </p:nvPr>
+        </p:nvSpPr>
+        <p:spPr/>
+        <p:txBody>
+          <a:bodyPr>
+            <a:normAutofit lnSpcReduction="10000"/>
+          </a:bodyPr>
+          <a:lstStyle/>
+          <a:p>
+            <a:r>
+              <a:rPr lang="en-US" b="1" dirty="0"/>
+              <a:t>UML</a:t>
+            </a:r>
+            <a:r>
+              <a:rPr lang="en-US" dirty="0"/>
+              <a:t>: Unified Modeling Language, industry standard for modeling object-oriented systems. </a:t>
+            </a:r>
+          </a:p>
+          <a:p>
+            <a:r>
+              <a:rPr lang="en-US" b="1" dirty="0" smtClean="0"/>
+              <a:t>BPMN</a:t>
+            </a:r>
+            <a:r>
+              <a:rPr lang="en-US" dirty="0" smtClean="0"/>
+              <a:t>: Business Process Model Notation, a graphical representation of business processes for an activity diagram.</a:t>
+            </a:r>
+          </a:p>
+          <a:p>
+            <a:pPr lvl="1"/>
+            <a:r>
+              <a:rPr lang="en-US" dirty="0" smtClean="0"/>
+              <a:t>Similar to, but simpler than, UML</a:t>
+            </a:r>
+          </a:p>
+          <a:p>
+            <a:pPr lvl="1"/>
+            <a:endParaRPr lang="en-US" dirty="0"/>
+          </a:p>
+          <a:p>
+            <a:pPr marL="457200" lvl="1" indent="0">
+              <a:buNone/>
+            </a:pPr>
+            <a:r>
+              <a:rPr lang="en-US" dirty="0" smtClean="0"/>
+              <a:t>	**Though both of these have formalized standards, there are many variations on both**</a:t>
+            </a:r>
+          </a:p>
+        </p:txBody>
+      </p:sp>
+    </p:spTree>
+    <p:extLst>
+      <p:ext uri="{BB962C8B-B14F-4D97-AF65-F5344CB8AC3E}">
+        <p14:creationId xmlns:p14="http://schemas.microsoft.com/office/powerpoint/2010/main" val="1445066488"/>
       </p:ext>
     </p:extLst>
   </p:cSld>
@@ -3669,6 +5556,1187 @@
           <a:p>
             <a:r>
               <a:rPr lang="en-US" dirty="0" smtClean="0"/>
+              <a:t>Agenda</a:t>
+            </a:r>
+            <a:endParaRPr lang="en-US" dirty="0"/>
+          </a:p>
+        </p:txBody>
+      </p:sp>
+      <p:sp>
+        <p:nvSpPr>
+          <p:cNvPr id="3" name="Content Placeholder 2"/>
+          <p:cNvSpPr>
+            <a:spLocks noGrp="1"/>
+          </p:cNvSpPr>
+          <p:nvPr>
+            <p:ph idx="1"/>
+          </p:nvPr>
+        </p:nvSpPr>
+        <p:spPr/>
+        <p:txBody>
+          <a:bodyPr/>
+          <a:lstStyle/>
+          <a:p>
+            <a:r>
+              <a:rPr lang="en-US" dirty="0" smtClean="0"/>
+              <a:t>Overview and Motivation for this lab</a:t>
+            </a:r>
+          </a:p>
+          <a:p>
+            <a:pPr lvl="1"/>
+            <a:r>
+              <a:rPr lang="en-US" dirty="0" smtClean="0"/>
+              <a:t>Integration with Case Study</a:t>
+            </a:r>
+          </a:p>
+          <a:p>
+            <a:pPr lvl="1"/>
+            <a:r>
+              <a:rPr lang="en-US" dirty="0" smtClean="0"/>
+              <a:t>Base on real data curation scenarios</a:t>
+            </a:r>
+          </a:p>
+          <a:p>
+            <a:r>
+              <a:rPr lang="en-US" dirty="0" smtClean="0"/>
+              <a:t>Requirements gathering</a:t>
+            </a:r>
+          </a:p>
+          <a:p>
+            <a:r>
+              <a:rPr lang="en-US" dirty="0" smtClean="0"/>
+              <a:t>Use case developments</a:t>
+            </a:r>
+          </a:p>
+          <a:p>
+            <a:r>
+              <a:rPr lang="en-US" dirty="0" smtClean="0"/>
+              <a:t>Activity diagramming</a:t>
+            </a:r>
+          </a:p>
+        </p:txBody>
+      </p:sp>
+    </p:spTree>
+    <p:extLst>
+      <p:ext uri="{BB962C8B-B14F-4D97-AF65-F5344CB8AC3E}">
+        <p14:creationId xmlns:p14="http://schemas.microsoft.com/office/powerpoint/2010/main" val="3978161906"/>
+      </p:ext>
+    </p:extLst>
+  </p:cSld>
+  <p:clrMapOvr>
+    <a:masterClrMapping/>
+  </p:clrMapOvr>
+</p:sld>
+</file>
+
+<file path=ppt/slides/slide20.xml><?xml version="1.0" encoding="utf-8"?>
+<p:sld xmlns:a="http://schemas.openxmlformats.org/drawingml/2006/main" xmlns:r="http://schemas.openxmlformats.org/officeDocument/2006/relationships" xmlns:p="http://schemas.openxmlformats.org/presentationml/2006/main">
+  <p:cSld>
+    <p:spTree>
+      <p:nvGrpSpPr>
+        <p:cNvPr id="1" name=""/>
+        <p:cNvGrpSpPr/>
+        <p:nvPr/>
+      </p:nvGrpSpPr>
+      <p:grpSpPr>
+        <a:xfrm>
+          <a:off x="0" y="0"/>
+          <a:ext cx="0" cy="0"/>
+          <a:chOff x="0" y="0"/>
+          <a:chExt cx="0" cy="0"/>
+        </a:xfrm>
+      </p:grpSpPr>
+      <p:sp>
+        <p:nvSpPr>
+          <p:cNvPr id="2" name="Title 1"/>
+          <p:cNvSpPr>
+            <a:spLocks noGrp="1"/>
+          </p:cNvSpPr>
+          <p:nvPr>
+            <p:ph type="title"/>
+          </p:nvPr>
+        </p:nvSpPr>
+        <p:spPr/>
+        <p:txBody>
+          <a:bodyPr/>
+          <a:lstStyle/>
+          <a:p>
+            <a:r>
+              <a:rPr lang="en-US" dirty="0" smtClean="0"/>
+              <a:t>Symbol meanings</a:t>
+            </a:r>
+            <a:endParaRPr lang="en-US" dirty="0"/>
+          </a:p>
+        </p:txBody>
+      </p:sp>
+      <p:sp>
+        <p:nvSpPr>
+          <p:cNvPr id="3" name="Content Placeholder 2"/>
+          <p:cNvSpPr>
+            <a:spLocks noGrp="1"/>
+          </p:cNvSpPr>
+          <p:nvPr>
+            <p:ph idx="1"/>
+          </p:nvPr>
+        </p:nvSpPr>
+        <p:spPr/>
+        <p:txBody>
+          <a:bodyPr>
+            <a:normAutofit/>
+          </a:bodyPr>
+          <a:lstStyle/>
+          <a:p>
+            <a:r>
+              <a:rPr lang="en-US" dirty="0" smtClean="0"/>
+              <a:t>Rectangle (sometimes w/round edges): process</a:t>
+            </a:r>
+            <a:endParaRPr lang="en-US" dirty="0"/>
+          </a:p>
+          <a:p>
+            <a:r>
+              <a:rPr lang="en-US" dirty="0" smtClean="0"/>
+              <a:t>Diamond</a:t>
+            </a:r>
+            <a:r>
+              <a:rPr lang="en-US" dirty="0"/>
+              <a:t>: decision </a:t>
+            </a:r>
+            <a:r>
+              <a:rPr lang="en-US" dirty="0" smtClean="0"/>
+              <a:t>point</a:t>
+            </a:r>
+          </a:p>
+          <a:p>
+            <a:r>
+              <a:rPr lang="en-US" dirty="0" smtClean="0"/>
+              <a:t>Arrows: connect sequential activities</a:t>
+            </a:r>
+          </a:p>
+          <a:p>
+            <a:r>
+              <a:rPr lang="en-US" dirty="0" smtClean="0"/>
+              <a:t>Long, flat rectangle: Fork</a:t>
+            </a:r>
+          </a:p>
+          <a:p>
+            <a:r>
+              <a:rPr lang="en-US" dirty="0" smtClean="0"/>
+              <a:t>Filled</a:t>
+            </a:r>
+            <a:r>
+              <a:rPr lang="en-US" dirty="0"/>
+              <a:t>-in </a:t>
+            </a:r>
+            <a:r>
+              <a:rPr lang="en-US" dirty="0" smtClean="0"/>
+              <a:t>circle: Start</a:t>
+            </a:r>
+            <a:endParaRPr lang="en-US" dirty="0"/>
+          </a:p>
+          <a:p>
+            <a:r>
+              <a:rPr lang="en-US" dirty="0" smtClean="0"/>
+              <a:t>Black </a:t>
+            </a:r>
+            <a:r>
+              <a:rPr lang="en-US" dirty="0"/>
+              <a:t>circle surrounded by a white </a:t>
+            </a:r>
+            <a:r>
+              <a:rPr lang="en-US" dirty="0" smtClean="0"/>
+              <a:t>circle: End</a:t>
+            </a:r>
+          </a:p>
+          <a:p>
+            <a:r>
+              <a:rPr lang="en-US" dirty="0" err="1" smtClean="0"/>
+              <a:t>Swimlanes</a:t>
+            </a:r>
+            <a:r>
+              <a:rPr lang="en-US" dirty="0" smtClean="0"/>
+              <a:t>: Assign responsibilities</a:t>
+            </a:r>
+            <a:endParaRPr lang="en-US" dirty="0"/>
+          </a:p>
+          <a:p>
+            <a:endParaRPr lang="en-US" dirty="0"/>
+          </a:p>
+        </p:txBody>
+      </p:sp>
+    </p:spTree>
+    <p:extLst>
+      <p:ext uri="{BB962C8B-B14F-4D97-AF65-F5344CB8AC3E}">
+        <p14:creationId xmlns:p14="http://schemas.microsoft.com/office/powerpoint/2010/main" val="358489203"/>
+      </p:ext>
+    </p:extLst>
+  </p:cSld>
+  <p:clrMapOvr>
+    <a:masterClrMapping/>
+  </p:clrMapOvr>
+</p:sld>
+</file>
+
+<file path=ppt/slides/slide21.xml><?xml version="1.0" encoding="utf-8"?>
+<p:sld xmlns:a="http://schemas.openxmlformats.org/drawingml/2006/main" xmlns:r="http://schemas.openxmlformats.org/officeDocument/2006/relationships" xmlns:p="http://schemas.openxmlformats.org/presentationml/2006/main">
+  <p:cSld>
+    <p:spTree>
+      <p:nvGrpSpPr>
+        <p:cNvPr id="1" name=""/>
+        <p:cNvGrpSpPr/>
+        <p:nvPr/>
+      </p:nvGrpSpPr>
+      <p:grpSpPr>
+        <a:xfrm>
+          <a:off x="0" y="0"/>
+          <a:ext cx="0" cy="0"/>
+          <a:chOff x="0" y="0"/>
+          <a:chExt cx="0" cy="0"/>
+        </a:xfrm>
+      </p:grpSpPr>
+      <p:pic>
+        <p:nvPicPr>
+          <p:cNvPr id="2" name="Picture 1" descr="Activity Diagram.tiff"/>
+          <p:cNvPicPr>
+            <a:picLocks noChangeAspect="1"/>
+          </p:cNvPicPr>
+          <p:nvPr/>
+        </p:nvPicPr>
+        <p:blipFill>
+          <a:blip r:embed="rId2">
+            <a:extLst>
+              <a:ext uri="{28A0092B-C50C-407E-A947-70E740481C1C}">
+                <a14:useLocalDpi xmlns:a14="http://schemas.microsoft.com/office/drawing/2010/main" val="0"/>
+              </a:ext>
+            </a:extLst>
+          </a:blip>
+          <a:stretch>
+            <a:fillRect/>
+          </a:stretch>
+        </p:blipFill>
+        <p:spPr>
+          <a:xfrm>
+            <a:off x="1960436" y="134338"/>
+            <a:ext cx="5247934" cy="5625785"/>
+          </a:xfrm>
+          <a:prstGeom prst="rect">
+            <a:avLst/>
+          </a:prstGeom>
+        </p:spPr>
+      </p:pic>
+      <p:sp>
+        <p:nvSpPr>
+          <p:cNvPr id="3" name="TextBox 2"/>
+          <p:cNvSpPr txBox="1"/>
+          <p:nvPr/>
+        </p:nvSpPr>
+        <p:spPr>
+          <a:xfrm>
+            <a:off x="7481906" y="4484363"/>
+            <a:ext cx="1468596" cy="646331"/>
+          </a:xfrm>
+          <a:prstGeom prst="rect">
+            <a:avLst/>
+          </a:prstGeom>
+          <a:noFill/>
+        </p:spPr>
+        <p:txBody>
+          <a:bodyPr wrap="square" rtlCol="0">
+            <a:spAutoFit/>
+          </a:bodyPr>
+          <a:lstStyle/>
+          <a:p>
+            <a:r>
+              <a:rPr lang="en-US" dirty="0" smtClean="0"/>
+              <a:t>Kendall &amp; Kendall 2011</a:t>
+            </a:r>
+            <a:endParaRPr lang="en-US" dirty="0"/>
+          </a:p>
+        </p:txBody>
+      </p:sp>
+    </p:spTree>
+    <p:extLst>
+      <p:ext uri="{BB962C8B-B14F-4D97-AF65-F5344CB8AC3E}">
+        <p14:creationId xmlns:p14="http://schemas.microsoft.com/office/powerpoint/2010/main" val="4092424572"/>
+      </p:ext>
+    </p:extLst>
+  </p:cSld>
+  <p:clrMapOvr>
+    <a:masterClrMapping/>
+  </p:clrMapOvr>
+</p:sld>
+</file>
+
+<file path=ppt/slides/slide22.xml><?xml version="1.0" encoding="utf-8"?>
+<p:sld xmlns:a="http://schemas.openxmlformats.org/drawingml/2006/main" xmlns:r="http://schemas.openxmlformats.org/officeDocument/2006/relationships" xmlns:p="http://schemas.openxmlformats.org/presentationml/2006/main">
+  <p:cSld>
+    <p:spTree>
+      <p:nvGrpSpPr>
+        <p:cNvPr id="1" name=""/>
+        <p:cNvGrpSpPr/>
+        <p:nvPr/>
+      </p:nvGrpSpPr>
+      <p:grpSpPr>
+        <a:xfrm>
+          <a:off x="0" y="0"/>
+          <a:ext cx="0" cy="0"/>
+          <a:chOff x="0" y="0"/>
+          <a:chExt cx="0" cy="0"/>
+        </a:xfrm>
+      </p:grpSpPr>
+      <p:pic>
+        <p:nvPicPr>
+          <p:cNvPr id="2" name="Picture 1" descr="LampFlowchart.svg.png"/>
+          <p:cNvPicPr>
+            <a:picLocks noChangeAspect="1"/>
+          </p:cNvPicPr>
+          <p:nvPr/>
+        </p:nvPicPr>
+        <p:blipFill>
+          <a:blip r:embed="rId3">
+            <a:extLst>
+              <a:ext uri="{28A0092B-C50C-407E-A947-70E740481C1C}">
+                <a14:useLocalDpi xmlns:a14="http://schemas.microsoft.com/office/drawing/2010/main" val="0"/>
+              </a:ext>
+            </a:extLst>
+          </a:blip>
+          <a:stretch>
+            <a:fillRect/>
+          </a:stretch>
+        </p:blipFill>
+        <p:spPr>
+          <a:xfrm>
+            <a:off x="602331" y="1081596"/>
+            <a:ext cx="2794000" cy="3810000"/>
+          </a:xfrm>
+          <a:prstGeom prst="rect">
+            <a:avLst/>
+          </a:prstGeom>
+        </p:spPr>
+      </p:pic>
+      <p:pic>
+        <p:nvPicPr>
+          <p:cNvPr id="3" name="Picture 2" descr="640px-Flowchart-template.jpg"/>
+          <p:cNvPicPr>
+            <a:picLocks noChangeAspect="1"/>
+          </p:cNvPicPr>
+          <p:nvPr/>
+        </p:nvPicPr>
+        <p:blipFill>
+          <a:blip r:embed="rId4">
+            <a:extLst>
+              <a:ext uri="{28A0092B-C50C-407E-A947-70E740481C1C}">
+                <a14:useLocalDpi xmlns:a14="http://schemas.microsoft.com/office/drawing/2010/main" val="0"/>
+              </a:ext>
+            </a:extLst>
+          </a:blip>
+          <a:stretch>
+            <a:fillRect/>
+          </a:stretch>
+        </p:blipFill>
+        <p:spPr>
+          <a:xfrm>
+            <a:off x="3655073" y="91633"/>
+            <a:ext cx="5326846" cy="6625265"/>
+          </a:xfrm>
+          <a:prstGeom prst="rect">
+            <a:avLst/>
+          </a:prstGeom>
+        </p:spPr>
+      </p:pic>
+    </p:spTree>
+    <p:extLst>
+      <p:ext uri="{BB962C8B-B14F-4D97-AF65-F5344CB8AC3E}">
+        <p14:creationId xmlns:p14="http://schemas.microsoft.com/office/powerpoint/2010/main" val="1958123052"/>
+      </p:ext>
+    </p:extLst>
+  </p:cSld>
+  <p:clrMapOvr>
+    <a:masterClrMapping/>
+  </p:clrMapOvr>
+  <p:timing>
+    <p:tnLst>
+      <p:par>
+        <p:cTn xmlns:p14="http://schemas.microsoft.com/office/powerpoint/2010/main" id="1" dur="indefinite" restart="never" nodeType="tmRoot"/>
+      </p:par>
+    </p:tnLst>
+  </p:timing>
+</p:sld>
+</file>
+
+<file path=ppt/slides/slide23.xml><?xml version="1.0" encoding="utf-8"?>
+<p:sld xmlns:a="http://schemas.openxmlformats.org/drawingml/2006/main" xmlns:r="http://schemas.openxmlformats.org/officeDocument/2006/relationships" xmlns:p="http://schemas.openxmlformats.org/presentationml/2006/main">
+  <p:cSld>
+    <p:spTree>
+      <p:nvGrpSpPr>
+        <p:cNvPr id="1" name=""/>
+        <p:cNvGrpSpPr/>
+        <p:nvPr/>
+      </p:nvGrpSpPr>
+      <p:grpSpPr>
+        <a:xfrm>
+          <a:off x="0" y="0"/>
+          <a:ext cx="0" cy="0"/>
+          <a:chOff x="0" y="0"/>
+          <a:chExt cx="0" cy="0"/>
+        </a:xfrm>
+      </p:grpSpPr>
+      <p:pic>
+        <p:nvPicPr>
+          <p:cNvPr id="2" name="Picture 1" descr="Designelements-Flowchart.png"/>
+          <p:cNvPicPr>
+            <a:picLocks noChangeAspect="1"/>
+          </p:cNvPicPr>
+          <p:nvPr/>
+        </p:nvPicPr>
+        <p:blipFill>
+          <a:blip r:embed="rId2">
+            <a:extLst>
+              <a:ext uri="{28A0092B-C50C-407E-A947-70E740481C1C}">
+                <a14:useLocalDpi xmlns:a14="http://schemas.microsoft.com/office/drawing/2010/main" val="0"/>
+              </a:ext>
+            </a:extLst>
+          </a:blip>
+          <a:stretch>
+            <a:fillRect/>
+          </a:stretch>
+        </p:blipFill>
+        <p:spPr>
+          <a:xfrm>
+            <a:off x="0" y="1469090"/>
+            <a:ext cx="9144000" cy="4244734"/>
+          </a:xfrm>
+          <a:prstGeom prst="rect">
+            <a:avLst/>
+          </a:prstGeom>
+        </p:spPr>
+      </p:pic>
+      <p:sp>
+        <p:nvSpPr>
+          <p:cNvPr id="3" name="TextBox 2"/>
+          <p:cNvSpPr txBox="1"/>
+          <p:nvPr/>
+        </p:nvSpPr>
+        <p:spPr>
+          <a:xfrm>
+            <a:off x="972449" y="377004"/>
+            <a:ext cx="7104834" cy="830997"/>
+          </a:xfrm>
+          <a:prstGeom prst="rect">
+            <a:avLst/>
+          </a:prstGeom>
+          <a:noFill/>
+        </p:spPr>
+        <p:txBody>
+          <a:bodyPr wrap="square" rtlCol="0">
+            <a:spAutoFit/>
+          </a:bodyPr>
+          <a:lstStyle/>
+          <a:p>
+            <a:pPr algn="ctr"/>
+            <a:r>
+              <a:rPr lang="en-US" sz="2400" dirty="0" smtClean="0">
+                <a:latin typeface="+mj-lt"/>
+              </a:rPr>
+              <a:t>More complex diagrams are possible, but out of scope for this lab</a:t>
+            </a:r>
+            <a:endParaRPr lang="en-US" sz="2400" dirty="0">
+              <a:latin typeface="+mj-lt"/>
+            </a:endParaRPr>
+          </a:p>
+        </p:txBody>
+      </p:sp>
+    </p:spTree>
+    <p:extLst>
+      <p:ext uri="{BB962C8B-B14F-4D97-AF65-F5344CB8AC3E}">
+        <p14:creationId xmlns:p14="http://schemas.microsoft.com/office/powerpoint/2010/main" val="3146005428"/>
+      </p:ext>
+    </p:extLst>
+  </p:cSld>
+  <p:clrMapOvr>
+    <a:masterClrMapping/>
+  </p:clrMapOvr>
+</p:sld>
+</file>
+
+<file path=ppt/slides/slide24.xml><?xml version="1.0" encoding="utf-8"?>
+<p:sld xmlns:a="http://schemas.openxmlformats.org/drawingml/2006/main" xmlns:r="http://schemas.openxmlformats.org/officeDocument/2006/relationships" xmlns:p="http://schemas.openxmlformats.org/presentationml/2006/main">
+  <p:cSld>
+    <p:spTree>
+      <p:nvGrpSpPr>
+        <p:cNvPr id="1" name=""/>
+        <p:cNvGrpSpPr/>
+        <p:nvPr/>
+      </p:nvGrpSpPr>
+      <p:grpSpPr>
+        <a:xfrm>
+          <a:off x="0" y="0"/>
+          <a:ext cx="0" cy="0"/>
+          <a:chOff x="0" y="0"/>
+          <a:chExt cx="0" cy="0"/>
+        </a:xfrm>
+      </p:grpSpPr>
+      <p:sp>
+        <p:nvSpPr>
+          <p:cNvPr id="2" name="Title 1"/>
+          <p:cNvSpPr>
+            <a:spLocks noGrp="1"/>
+          </p:cNvSpPr>
+          <p:nvPr>
+            <p:ph type="title"/>
+          </p:nvPr>
+        </p:nvSpPr>
+        <p:spPr/>
+        <p:txBody>
+          <a:bodyPr/>
+          <a:lstStyle/>
+          <a:p>
+            <a:r>
+              <a:rPr lang="en-US" dirty="0" smtClean="0"/>
+              <a:t>Creating Activity Diagrams</a:t>
+            </a:r>
+            <a:endParaRPr lang="en-US" dirty="0"/>
+          </a:p>
+        </p:txBody>
+      </p:sp>
+      <p:sp>
+        <p:nvSpPr>
+          <p:cNvPr id="3" name="Content Placeholder 2"/>
+          <p:cNvSpPr>
+            <a:spLocks noGrp="1"/>
+          </p:cNvSpPr>
+          <p:nvPr>
+            <p:ph idx="1"/>
+          </p:nvPr>
+        </p:nvSpPr>
+        <p:spPr/>
+        <p:txBody>
+          <a:bodyPr/>
+          <a:lstStyle/>
+          <a:p>
+            <a:r>
+              <a:rPr lang="en-US" dirty="0"/>
+              <a:t>Created by asking what happens first, what happens second, and so on </a:t>
+            </a:r>
+          </a:p>
+          <a:p>
+            <a:r>
+              <a:rPr lang="en-US" dirty="0"/>
+              <a:t>Must determine what activities are done in sequence or in parallel </a:t>
+            </a:r>
+          </a:p>
+          <a:p>
+            <a:r>
+              <a:rPr lang="en-US" dirty="0"/>
+              <a:t>The sequence of activities can be determined from physical data flow diagrams. </a:t>
+            </a:r>
+          </a:p>
+          <a:p>
+            <a:r>
+              <a:rPr lang="en-US" dirty="0"/>
+              <a:t>Can be created by examining all the scenarios for a use case </a:t>
+            </a:r>
+          </a:p>
+          <a:p>
+            <a:endParaRPr lang="en-US" dirty="0"/>
+          </a:p>
+        </p:txBody>
+      </p:sp>
+    </p:spTree>
+    <p:extLst>
+      <p:ext uri="{BB962C8B-B14F-4D97-AF65-F5344CB8AC3E}">
+        <p14:creationId xmlns:p14="http://schemas.microsoft.com/office/powerpoint/2010/main" val="1720220676"/>
+      </p:ext>
+    </p:extLst>
+  </p:cSld>
+  <p:clrMapOvr>
+    <a:masterClrMapping/>
+  </p:clrMapOvr>
+</p:sld>
+</file>
+
+<file path=ppt/slides/slide25.xml><?xml version="1.0" encoding="utf-8"?>
+<p:sld xmlns:a="http://schemas.openxmlformats.org/drawingml/2006/main" xmlns:r="http://schemas.openxmlformats.org/officeDocument/2006/relationships" xmlns:p="http://schemas.openxmlformats.org/presentationml/2006/main">
+  <p:cSld>
+    <p:spTree>
+      <p:nvGrpSpPr>
+        <p:cNvPr id="1" name=""/>
+        <p:cNvGrpSpPr/>
+        <p:nvPr/>
+      </p:nvGrpSpPr>
+      <p:grpSpPr>
+        <a:xfrm>
+          <a:off x="0" y="0"/>
+          <a:ext cx="0" cy="0"/>
+          <a:chOff x="0" y="0"/>
+          <a:chExt cx="0" cy="0"/>
+        </a:xfrm>
+      </p:grpSpPr>
+      <p:pic>
+        <p:nvPicPr>
+          <p:cNvPr id="5" name="Picture 4" descr="Workflow1.png"/>
+          <p:cNvPicPr>
+            <a:picLocks noChangeAspect="1"/>
+          </p:cNvPicPr>
+          <p:nvPr/>
+        </p:nvPicPr>
+        <p:blipFill>
+          <a:blip r:embed="rId3">
+            <a:extLst>
+              <a:ext uri="{28A0092B-C50C-407E-A947-70E740481C1C}">
+                <a14:useLocalDpi xmlns:a14="http://schemas.microsoft.com/office/drawing/2010/main" val="0"/>
+              </a:ext>
+            </a:extLst>
+          </a:blip>
+          <a:stretch>
+            <a:fillRect/>
+          </a:stretch>
+        </p:blipFill>
+        <p:spPr>
+          <a:xfrm>
+            <a:off x="0" y="750377"/>
+            <a:ext cx="9144000" cy="4237262"/>
+          </a:xfrm>
+          <a:prstGeom prst="rect">
+            <a:avLst/>
+          </a:prstGeom>
+        </p:spPr>
+      </p:pic>
+    </p:spTree>
+    <p:extLst>
+      <p:ext uri="{BB962C8B-B14F-4D97-AF65-F5344CB8AC3E}">
+        <p14:creationId xmlns:p14="http://schemas.microsoft.com/office/powerpoint/2010/main" val="2211595489"/>
+      </p:ext>
+    </p:extLst>
+  </p:cSld>
+  <p:clrMapOvr>
+    <a:masterClrMapping/>
+  </p:clrMapOvr>
+  <p:timing>
+    <p:tnLst>
+      <p:par>
+        <p:cTn xmlns:p14="http://schemas.microsoft.com/office/powerpoint/2010/main" id="1" dur="indefinite" restart="never" nodeType="tmRoot"/>
+      </p:par>
+    </p:tnLst>
+  </p:timing>
+</p:sld>
+</file>
+
+<file path=ppt/slides/slide26.xml><?xml version="1.0" encoding="utf-8"?>
+<p:sld xmlns:a="http://schemas.openxmlformats.org/drawingml/2006/main" xmlns:r="http://schemas.openxmlformats.org/officeDocument/2006/relationships" xmlns:p="http://schemas.openxmlformats.org/presentationml/2006/main">
+  <p:cSld>
+    <p:spTree>
+      <p:nvGrpSpPr>
+        <p:cNvPr id="1" name=""/>
+        <p:cNvGrpSpPr/>
+        <p:nvPr/>
+      </p:nvGrpSpPr>
+      <p:grpSpPr>
+        <a:xfrm>
+          <a:off x="0" y="0"/>
+          <a:ext cx="0" cy="0"/>
+          <a:chOff x="0" y="0"/>
+          <a:chExt cx="0" cy="0"/>
+        </a:xfrm>
+      </p:grpSpPr>
+      <p:sp>
+        <p:nvSpPr>
+          <p:cNvPr id="2" name="Title 1"/>
+          <p:cNvSpPr>
+            <a:spLocks noGrp="1"/>
+          </p:cNvSpPr>
+          <p:nvPr>
+            <p:ph type="title"/>
+          </p:nvPr>
+        </p:nvSpPr>
+        <p:spPr/>
+        <p:txBody>
+          <a:bodyPr>
+            <a:normAutofit fontScale="90000"/>
+          </a:bodyPr>
+          <a:lstStyle/>
+          <a:p>
+            <a:r>
+              <a:rPr lang="en-US" dirty="0" smtClean="0"/>
+              <a:t>When to create an activity diagram</a:t>
+            </a:r>
+            <a:endParaRPr lang="en-US" dirty="0"/>
+          </a:p>
+        </p:txBody>
+      </p:sp>
+      <p:sp>
+        <p:nvSpPr>
+          <p:cNvPr id="3" name="Content Placeholder 2"/>
+          <p:cNvSpPr>
+            <a:spLocks noGrp="1"/>
+          </p:cNvSpPr>
+          <p:nvPr>
+            <p:ph idx="1"/>
+          </p:nvPr>
+        </p:nvSpPr>
+        <p:spPr/>
+        <p:txBody>
+          <a:bodyPr/>
+          <a:lstStyle/>
+          <a:p>
+            <a:r>
+              <a:rPr lang="en-US" dirty="0" smtClean="0"/>
+              <a:t>If </a:t>
+            </a:r>
+            <a:r>
+              <a:rPr lang="en-US" dirty="0"/>
+              <a:t>i</a:t>
+            </a:r>
+            <a:r>
+              <a:rPr lang="en-US" dirty="0" smtClean="0"/>
+              <a:t>t </a:t>
+            </a:r>
+            <a:r>
+              <a:rPr lang="en-US" dirty="0"/>
+              <a:t>helps to understand the activities of a use case </a:t>
+            </a:r>
+            <a:endParaRPr lang="en-US" dirty="0" smtClean="0"/>
+          </a:p>
+          <a:p>
+            <a:r>
+              <a:rPr lang="en-US" dirty="0" smtClean="0"/>
+              <a:t>The </a:t>
+            </a:r>
+            <a:r>
+              <a:rPr lang="en-US" dirty="0"/>
+              <a:t>flow of control is complex </a:t>
+            </a:r>
+            <a:endParaRPr lang="en-US" dirty="0" smtClean="0"/>
+          </a:p>
+          <a:p>
+            <a:r>
+              <a:rPr lang="en-US" dirty="0" smtClean="0"/>
+              <a:t>There </a:t>
+            </a:r>
+            <a:r>
+              <a:rPr lang="en-US" dirty="0"/>
+              <a:t>is a need to model workflow </a:t>
+            </a:r>
+          </a:p>
+          <a:p>
+            <a:r>
+              <a:rPr lang="en-US" dirty="0" smtClean="0"/>
+              <a:t>When </a:t>
+            </a:r>
+            <a:r>
+              <a:rPr lang="en-US" dirty="0"/>
+              <a:t>all scenarios for a use case need to be shown </a:t>
+            </a:r>
+          </a:p>
+          <a:p>
+            <a:endParaRPr lang="en-US" dirty="0"/>
+          </a:p>
+        </p:txBody>
+      </p:sp>
+    </p:spTree>
+    <p:extLst>
+      <p:ext uri="{BB962C8B-B14F-4D97-AF65-F5344CB8AC3E}">
+        <p14:creationId xmlns:p14="http://schemas.microsoft.com/office/powerpoint/2010/main" val="3990151616"/>
+      </p:ext>
+    </p:extLst>
+  </p:cSld>
+  <p:clrMapOvr>
+    <a:masterClrMapping/>
+  </p:clrMapOvr>
+</p:sld>
+</file>
+
+<file path=ppt/slides/slide27.xml><?xml version="1.0" encoding="utf-8"?>
+<p:sld xmlns:a="http://schemas.openxmlformats.org/drawingml/2006/main" xmlns:r="http://schemas.openxmlformats.org/officeDocument/2006/relationships" xmlns:p="http://schemas.openxmlformats.org/presentationml/2006/main">
+  <p:cSld>
+    <p:spTree>
+      <p:nvGrpSpPr>
+        <p:cNvPr id="1" name=""/>
+        <p:cNvGrpSpPr/>
+        <p:nvPr/>
+      </p:nvGrpSpPr>
+      <p:grpSpPr>
+        <a:xfrm>
+          <a:off x="0" y="0"/>
+          <a:ext cx="0" cy="0"/>
+          <a:chOff x="0" y="0"/>
+          <a:chExt cx="0" cy="0"/>
+        </a:xfrm>
+      </p:grpSpPr>
+      <p:sp>
+        <p:nvSpPr>
+          <p:cNvPr id="2" name="Title 1"/>
+          <p:cNvSpPr>
+            <a:spLocks noGrp="1"/>
+          </p:cNvSpPr>
+          <p:nvPr>
+            <p:ph type="title"/>
+          </p:nvPr>
+        </p:nvSpPr>
+        <p:spPr/>
+        <p:txBody>
+          <a:bodyPr/>
+          <a:lstStyle/>
+          <a:p>
+            <a:endParaRPr lang="en-US" dirty="0"/>
+          </a:p>
+        </p:txBody>
+      </p:sp>
+      <p:sp>
+        <p:nvSpPr>
+          <p:cNvPr id="3" name="Content Placeholder 2"/>
+          <p:cNvSpPr>
+            <a:spLocks noGrp="1"/>
+          </p:cNvSpPr>
+          <p:nvPr>
+            <p:ph idx="1"/>
+          </p:nvPr>
+        </p:nvSpPr>
+        <p:spPr/>
+        <p:txBody>
+          <a:bodyPr/>
+          <a:lstStyle/>
+          <a:p>
+            <a:endParaRPr lang="en-US"/>
+          </a:p>
+        </p:txBody>
+      </p:sp>
+    </p:spTree>
+    <p:extLst>
+      <p:ext uri="{BB962C8B-B14F-4D97-AF65-F5344CB8AC3E}">
+        <p14:creationId xmlns:p14="http://schemas.microsoft.com/office/powerpoint/2010/main" val="4199399279"/>
+      </p:ext>
+    </p:extLst>
+  </p:cSld>
+  <p:clrMapOvr>
+    <a:masterClrMapping/>
+  </p:clrMapOvr>
+</p:sld>
+</file>
+
+<file path=ppt/slides/slide3.xml><?xml version="1.0" encoding="utf-8"?>
+<p:sld xmlns:a="http://schemas.openxmlformats.org/drawingml/2006/main" xmlns:r="http://schemas.openxmlformats.org/officeDocument/2006/relationships" xmlns:p="http://schemas.openxmlformats.org/presentationml/2006/main">
+  <p:cSld>
+    <p:spTree>
+      <p:nvGrpSpPr>
+        <p:cNvPr id="1" name=""/>
+        <p:cNvGrpSpPr/>
+        <p:nvPr/>
+      </p:nvGrpSpPr>
+      <p:grpSpPr>
+        <a:xfrm>
+          <a:off x="0" y="0"/>
+          <a:ext cx="0" cy="0"/>
+          <a:chOff x="0" y="0"/>
+          <a:chExt cx="0" cy="0"/>
+        </a:xfrm>
+      </p:grpSpPr>
+      <p:sp>
+        <p:nvSpPr>
+          <p:cNvPr id="2" name="Title 1"/>
+          <p:cNvSpPr>
+            <a:spLocks noGrp="1"/>
+          </p:cNvSpPr>
+          <p:nvPr>
+            <p:ph type="title"/>
+          </p:nvPr>
+        </p:nvSpPr>
+        <p:spPr/>
+        <p:txBody>
+          <a:bodyPr/>
+          <a:lstStyle/>
+          <a:p>
+            <a:r>
+              <a:rPr lang="en-US" dirty="0" smtClean="0"/>
+              <a:t>Motivation</a:t>
+            </a:r>
+            <a:endParaRPr lang="en-US" dirty="0"/>
+          </a:p>
+        </p:txBody>
+      </p:sp>
+      <p:sp>
+        <p:nvSpPr>
+          <p:cNvPr id="3" name="Content Placeholder 2"/>
+          <p:cNvSpPr>
+            <a:spLocks noGrp="1"/>
+          </p:cNvSpPr>
+          <p:nvPr>
+            <p:ph idx="1"/>
+          </p:nvPr>
+        </p:nvSpPr>
+        <p:spPr/>
+        <p:txBody>
+          <a:bodyPr/>
+          <a:lstStyle/>
+          <a:p>
+            <a:r>
+              <a:rPr lang="en-US" dirty="0" smtClean="0"/>
+              <a:t>Systems analysis and design</a:t>
+            </a:r>
+          </a:p>
+          <a:p>
+            <a:pPr lvl="1"/>
+            <a:r>
+              <a:rPr lang="en-US" dirty="0" smtClean="0"/>
+              <a:t>Part of data curation skill-set</a:t>
+            </a:r>
+          </a:p>
+          <a:p>
+            <a:pPr lvl="1"/>
+            <a:r>
+              <a:rPr lang="en-US" dirty="0" smtClean="0"/>
+              <a:t>Library and Archives active in research processes</a:t>
+            </a:r>
+          </a:p>
+          <a:p>
+            <a:pPr lvl="1"/>
+            <a:r>
+              <a:rPr lang="en-US" dirty="0" smtClean="0"/>
+              <a:t>Points of important intervention for curation</a:t>
+            </a:r>
+          </a:p>
+          <a:p>
+            <a:pPr marL="457200" lvl="1" indent="0">
+              <a:buNone/>
+            </a:pPr>
+            <a:endParaRPr lang="en-US" dirty="0"/>
+          </a:p>
+        </p:txBody>
+      </p:sp>
+    </p:spTree>
+    <p:extLst>
+      <p:ext uri="{BB962C8B-B14F-4D97-AF65-F5344CB8AC3E}">
+        <p14:creationId xmlns:p14="http://schemas.microsoft.com/office/powerpoint/2010/main" val="3767699585"/>
+      </p:ext>
+    </p:extLst>
+  </p:cSld>
+  <p:clrMapOvr>
+    <a:masterClrMapping/>
+  </p:clrMapOvr>
+</p:sld>
+</file>
+
+<file path=ppt/slides/slide4.xml><?xml version="1.0" encoding="utf-8"?>
+<p:sld xmlns:a="http://schemas.openxmlformats.org/drawingml/2006/main" xmlns:r="http://schemas.openxmlformats.org/officeDocument/2006/relationships" xmlns:p="http://schemas.openxmlformats.org/presentationml/2006/main">
+  <p:cSld>
+    <p:spTree>
+      <p:nvGrpSpPr>
+        <p:cNvPr id="1" name=""/>
+        <p:cNvGrpSpPr/>
+        <p:nvPr/>
+      </p:nvGrpSpPr>
+      <p:grpSpPr>
+        <a:xfrm>
+          <a:off x="0" y="0"/>
+          <a:ext cx="0" cy="0"/>
+          <a:chOff x="0" y="0"/>
+          <a:chExt cx="0" cy="0"/>
+        </a:xfrm>
+      </p:grpSpPr>
+      <p:sp>
+        <p:nvSpPr>
+          <p:cNvPr id="2" name="Title 1"/>
+          <p:cNvSpPr>
+            <a:spLocks noGrp="1"/>
+          </p:cNvSpPr>
+          <p:nvPr>
+            <p:ph type="title"/>
+          </p:nvPr>
+        </p:nvSpPr>
+        <p:spPr/>
+        <p:txBody>
+          <a:bodyPr/>
+          <a:lstStyle/>
+          <a:p>
+            <a:r>
+              <a:rPr lang="en-US" dirty="0" smtClean="0"/>
+              <a:t>Potential Activities</a:t>
+            </a:r>
+            <a:endParaRPr lang="en-US" dirty="0"/>
+          </a:p>
+        </p:txBody>
+      </p:sp>
+      <p:sp>
+        <p:nvSpPr>
+          <p:cNvPr id="3" name="Content Placeholder 2"/>
+          <p:cNvSpPr>
+            <a:spLocks noGrp="1"/>
+          </p:cNvSpPr>
+          <p:nvPr>
+            <p:ph idx="1"/>
+          </p:nvPr>
+        </p:nvSpPr>
+        <p:spPr/>
+        <p:txBody>
+          <a:bodyPr/>
+          <a:lstStyle/>
+          <a:p>
+            <a:r>
+              <a:rPr lang="en-US" dirty="0" smtClean="0"/>
+              <a:t>Implementing a new repository system</a:t>
+            </a:r>
+          </a:p>
+          <a:p>
+            <a:r>
+              <a:rPr lang="en-US" dirty="0" smtClean="0"/>
+              <a:t>Appraising existing system used in campus laboratory</a:t>
+            </a:r>
+          </a:p>
+          <a:p>
+            <a:r>
+              <a:rPr lang="en-US" dirty="0" smtClean="0"/>
+              <a:t>Consulting on design of new system for campus unit</a:t>
+            </a:r>
+          </a:p>
+          <a:p>
+            <a:r>
+              <a:rPr lang="en-US" b="1" dirty="0" smtClean="0"/>
+              <a:t>PRICING </a:t>
+            </a:r>
+            <a:r>
+              <a:rPr lang="en-US" dirty="0" smtClean="0"/>
+              <a:t>all of the above</a:t>
+            </a:r>
+          </a:p>
+          <a:p>
+            <a:endParaRPr lang="en-US" dirty="0"/>
+          </a:p>
+        </p:txBody>
+      </p:sp>
+    </p:spTree>
+    <p:extLst>
+      <p:ext uri="{BB962C8B-B14F-4D97-AF65-F5344CB8AC3E}">
+        <p14:creationId xmlns:p14="http://schemas.microsoft.com/office/powerpoint/2010/main" val="1020215793"/>
+      </p:ext>
+    </p:extLst>
+  </p:cSld>
+  <p:clrMapOvr>
+    <a:masterClrMapping/>
+  </p:clrMapOvr>
+</p:sld>
+</file>
+
+<file path=ppt/slides/slide5.xml><?xml version="1.0" encoding="utf-8"?>
+<p:sld xmlns:a="http://schemas.openxmlformats.org/drawingml/2006/main" xmlns:r="http://schemas.openxmlformats.org/officeDocument/2006/relationships" xmlns:p="http://schemas.openxmlformats.org/presentationml/2006/main">
+  <p:cSld>
+    <p:spTree>
+      <p:nvGrpSpPr>
+        <p:cNvPr id="1" name=""/>
+        <p:cNvGrpSpPr/>
+        <p:nvPr/>
+      </p:nvGrpSpPr>
+      <p:grpSpPr>
+        <a:xfrm>
+          <a:off x="0" y="0"/>
+          <a:ext cx="0" cy="0"/>
+          <a:chOff x="0" y="0"/>
+          <a:chExt cx="0" cy="0"/>
+        </a:xfrm>
+      </p:grpSpPr>
+      <p:sp>
+        <p:nvSpPr>
+          <p:cNvPr id="2" name="Title 1"/>
+          <p:cNvSpPr>
+            <a:spLocks noGrp="1"/>
+          </p:cNvSpPr>
+          <p:nvPr>
+            <p:ph type="title"/>
+          </p:nvPr>
+        </p:nvSpPr>
+        <p:spPr>
+          <a:xfrm>
+            <a:off x="457200" y="1972075"/>
+            <a:ext cx="8229600" cy="1143000"/>
+          </a:xfrm>
+        </p:spPr>
+        <p:txBody>
+          <a:bodyPr>
+            <a:normAutofit fontScale="90000"/>
+          </a:bodyPr>
+          <a:lstStyle/>
+          <a:p>
+            <a:r>
+              <a:rPr lang="en-US" dirty="0" smtClean="0"/>
+              <a:t>This can be a science…</a:t>
+            </a:r>
+            <a:br>
+              <a:rPr lang="en-US" dirty="0" smtClean="0"/>
+            </a:br>
+            <a:r>
+              <a:rPr lang="en-US" dirty="0"/>
+              <a:t/>
+            </a:r>
+            <a:br>
+              <a:rPr lang="en-US" dirty="0"/>
+            </a:br>
+            <a:r>
+              <a:rPr lang="en-US" dirty="0" smtClean="0"/>
+              <a:t>But, the golden rule applies:</a:t>
+            </a:r>
+            <a:br>
+              <a:rPr lang="en-US" dirty="0" smtClean="0"/>
+            </a:br>
+            <a:r>
+              <a:rPr lang="en-US" dirty="0"/>
+              <a:t/>
+            </a:r>
+            <a:br>
+              <a:rPr lang="en-US" dirty="0"/>
+            </a:br>
+            <a:r>
+              <a:rPr lang="en-US" dirty="0" smtClean="0"/>
+              <a:t>Form meets function</a:t>
+            </a:r>
+            <a:endParaRPr lang="en-US" dirty="0"/>
+          </a:p>
+        </p:txBody>
+      </p:sp>
+    </p:spTree>
+    <p:extLst>
+      <p:ext uri="{BB962C8B-B14F-4D97-AF65-F5344CB8AC3E}">
+        <p14:creationId xmlns:p14="http://schemas.microsoft.com/office/powerpoint/2010/main" val="2876492285"/>
+      </p:ext>
+    </p:extLst>
+  </p:cSld>
+  <p:clrMapOvr>
+    <a:masterClrMapping/>
+  </p:clrMapOvr>
+</p:sld>
+</file>
+
+<file path=ppt/slides/slide6.xml><?xml version="1.0" encoding="utf-8"?>
+<p:sld xmlns:a="http://schemas.openxmlformats.org/drawingml/2006/main" xmlns:r="http://schemas.openxmlformats.org/officeDocument/2006/relationships" xmlns:p="http://schemas.openxmlformats.org/presentationml/2006/main">
+  <p:cSld>
+    <p:spTree>
+      <p:nvGrpSpPr>
+        <p:cNvPr id="1" name=""/>
+        <p:cNvGrpSpPr/>
+        <p:nvPr/>
+      </p:nvGrpSpPr>
+      <p:grpSpPr>
+        <a:xfrm>
+          <a:off x="0" y="0"/>
+          <a:ext cx="0" cy="0"/>
+          <a:chOff x="0" y="0"/>
+          <a:chExt cx="0" cy="0"/>
+        </a:xfrm>
+      </p:grpSpPr>
+      <p:sp>
+        <p:nvSpPr>
+          <p:cNvPr id="2" name="Title 1"/>
+          <p:cNvSpPr>
+            <a:spLocks noGrp="1"/>
+          </p:cNvSpPr>
+          <p:nvPr>
+            <p:ph type="title"/>
+          </p:nvPr>
+        </p:nvSpPr>
+        <p:spPr/>
+        <p:txBody>
+          <a:bodyPr/>
+          <a:lstStyle/>
+          <a:p>
+            <a:r>
+              <a:rPr lang="en-US" dirty="0" smtClean="0"/>
               <a:t>Informal Workflow</a:t>
             </a:r>
             <a:endParaRPr lang="en-US" dirty="0"/>
@@ -3684,7 +6752,7 @@
           <p:nvPr/>
         </p:nvPicPr>
         <p:blipFill>
-          <a:blip r:embed="rId2">
+          <a:blip r:embed="rId3">
             <a:extLst>
               <a:ext uri="{28A0092B-C50C-407E-A947-70E740481C1C}">
                 <a14:useLocalDpi xmlns:a14="http://schemas.microsoft.com/office/drawing/2010/main" val="0"/>
@@ -3771,7 +6839,7 @@
 </p:sld>
 </file>
 
-<file path=ppt/slides/slide3.xml><?xml version="1.0" encoding="utf-8"?>
+<file path=ppt/slides/slide7.xml><?xml version="1.0" encoding="utf-8"?>
 <p:sld xmlns:a="http://schemas.openxmlformats.org/drawingml/2006/main" xmlns:r="http://schemas.openxmlformats.org/officeDocument/2006/relationships" xmlns:p="http://schemas.openxmlformats.org/presentationml/2006/main">
   <p:cSld>
     <p:spTree>
@@ -3831,7 +6899,7 @@
 </p:sld>
 </file>
 
-<file path=ppt/slides/slide4.xml><?xml version="1.0" encoding="utf-8"?>
+<file path=ppt/slides/slide8.xml><?xml version="1.0" encoding="utf-8"?>
 <p:sld xmlns:a="http://schemas.openxmlformats.org/drawingml/2006/main" xmlns:r="http://schemas.openxmlformats.org/officeDocument/2006/relationships" xmlns:p="http://schemas.openxmlformats.org/presentationml/2006/main">
   <p:cSld>
     <p:spTree>
@@ -3850,25 +6918,6 @@
       </p:grpSpPr>
       <p:sp>
         <p:nvSpPr>
-          <p:cNvPr id="2" name="Title 1"/>
-          <p:cNvSpPr>
-            <a:spLocks noGrp="1"/>
-          </p:cNvSpPr>
-          <p:nvPr>
-            <p:ph type="title"/>
-          </p:nvPr>
-        </p:nvSpPr>
-        <p:spPr/>
-        <p:txBody>
-          <a:bodyPr/>
-          <a:lstStyle/>
-          <a:p>
-            <a:endParaRPr lang="en-US"/>
-          </a:p>
-        </p:txBody>
-      </p:sp>
-      <p:sp>
-        <p:nvSpPr>
           <p:cNvPr id="3" name="Content Placeholder 2"/>
           <p:cNvSpPr>
             <a:spLocks noGrp="1"/>
@@ -3877,21 +6926,92 @@
             <p:ph idx="1"/>
           </p:nvPr>
         </p:nvSpPr>
-        <p:spPr/>
-        <p:txBody>
-          <a:bodyPr/>
-          <a:lstStyle/>
-          <a:p>
-            <a:r>
-              <a:rPr lang="en-US" dirty="0" smtClean="0"/>
-              <a:t>The problem is  - we want to be able to create usable, reliable workflows – and we want to document things such that our colleagues in another institution, department or college can understand them *immediately* </a:t>
-            </a:r>
-          </a:p>
-          <a:p>
-            <a:endParaRPr lang="en-US"/>
-          </a:p>
-          <a:p>
-            <a:endParaRPr lang="en-US"/>
+        <p:spPr>
+          <a:xfrm>
+            <a:off x="457200" y="1054171"/>
+            <a:ext cx="8229600" cy="4525963"/>
+          </a:xfrm>
+        </p:spPr>
+        <p:txBody>
+          <a:bodyPr/>
+          <a:lstStyle/>
+          <a:p>
+            <a:pPr marL="0" indent="0">
+              <a:buNone/>
+            </a:pPr>
+            <a:r>
+              <a:rPr lang="en-US" dirty="0" smtClean="0"/>
+              <a:t>In data curation we </a:t>
+            </a:r>
+            <a:r>
+              <a:rPr lang="en-US" dirty="0" smtClean="0"/>
+              <a:t>want to be able to </a:t>
+            </a:r>
+            <a:r>
+              <a:rPr lang="en-US" dirty="0" smtClean="0"/>
+              <a:t>create:</a:t>
+            </a:r>
+          </a:p>
+          <a:p>
+            <a:pPr marL="0" indent="0">
+              <a:buNone/>
+            </a:pPr>
+            <a:endParaRPr lang="en-US" dirty="0" smtClean="0"/>
+          </a:p>
+          <a:p>
+            <a:pPr>
+              <a:buFontTx/>
+              <a:buChar char="-"/>
+            </a:pPr>
+            <a:r>
+              <a:rPr lang="en-US" dirty="0" smtClean="0"/>
+              <a:t>Usable</a:t>
+            </a:r>
+            <a:r>
+              <a:rPr lang="en-US" dirty="0" smtClean="0"/>
+              <a:t> and</a:t>
+            </a:r>
+            <a:r>
+              <a:rPr lang="en-US" dirty="0" smtClean="0"/>
+              <a:t> </a:t>
+            </a:r>
+            <a:r>
+              <a:rPr lang="en-US" dirty="0" smtClean="0"/>
+              <a:t>reliable workflows </a:t>
+            </a:r>
+            <a:endParaRPr lang="en-US" dirty="0" smtClean="0"/>
+          </a:p>
+          <a:p>
+            <a:pPr>
+              <a:buFontTx/>
+              <a:buChar char="-"/>
+            </a:pPr>
+            <a:r>
+              <a:rPr lang="en-US" dirty="0" smtClean="0"/>
+              <a:t>to </a:t>
+            </a:r>
+            <a:r>
+              <a:rPr lang="en-US" dirty="0" smtClean="0"/>
+              <a:t>document things such that our colleagues in another institution, department or college can understand them *immediately* </a:t>
+            </a:r>
+            <a:endParaRPr lang="en-US" dirty="0" smtClean="0"/>
+          </a:p>
+          <a:p>
+            <a:pPr>
+              <a:buFontTx/>
+              <a:buChar char="-"/>
+            </a:pPr>
+            <a:r>
+              <a:rPr lang="en-US" dirty="0" smtClean="0"/>
+              <a:t>And reuse them indefinitely</a:t>
+            </a:r>
+            <a:endParaRPr lang="en-US" dirty="0" smtClean="0"/>
+          </a:p>
+          <a:p>
+            <a:endParaRPr lang="en-US" dirty="0"/>
+          </a:p>
+          <a:p>
+            <a:endParaRPr lang="en-US" dirty="0"/>
           </a:p>
         </p:txBody>
       </p:sp>
@@ -3899,6 +7019,133 @@
     <p:extLst>
       <p:ext uri="{BB962C8B-B14F-4D97-AF65-F5344CB8AC3E}">
         <p14:creationId xmlns:p14="http://schemas.microsoft.com/office/powerpoint/2010/main" val="731664716"/>
+      </p:ext>
+    </p:extLst>
+  </p:cSld>
+  <p:clrMapOvr>
+    <a:masterClrMapping/>
+  </p:clrMapOvr>
+</p:sld>
+</file>
+
+<file path=ppt/slides/slide9.xml><?xml version="1.0" encoding="utf-8"?>
+<p:sld xmlns:a="http://schemas.openxmlformats.org/drawingml/2006/main" xmlns:r="http://schemas.openxmlformats.org/officeDocument/2006/relationships" xmlns:p="http://schemas.openxmlformats.org/presentationml/2006/main">
+  <p:cSld>
+    <p:spTree>
+      <p:nvGrpSpPr>
+        <p:cNvPr id="1" name=""/>
+        <p:cNvGrpSpPr/>
+        <p:nvPr/>
+      </p:nvGrpSpPr>
+      <p:grpSpPr>
+        <a:xfrm>
+          <a:off x="0" y="0"/>
+          <a:ext cx="0" cy="0"/>
+          <a:chOff x="0" y="0"/>
+          <a:chExt cx="0" cy="0"/>
+        </a:xfrm>
+      </p:grpSpPr>
+      <p:sp>
+        <p:nvSpPr>
+          <p:cNvPr id="2" name="Title 1"/>
+          <p:cNvSpPr>
+            <a:spLocks noGrp="1"/>
+          </p:cNvSpPr>
+          <p:nvPr>
+            <p:ph type="title"/>
+          </p:nvPr>
+        </p:nvSpPr>
+        <p:spPr/>
+        <p:txBody>
+          <a:bodyPr/>
+          <a:lstStyle/>
+          <a:p>
+            <a:r>
+              <a:rPr lang="en-US" dirty="0" smtClean="0"/>
+              <a:t>Formal Systems Analysis</a:t>
+            </a:r>
+            <a:endParaRPr lang="en-US" dirty="0"/>
+          </a:p>
+        </p:txBody>
+      </p:sp>
+      <p:sp>
+        <p:nvSpPr>
+          <p:cNvPr id="3" name="Content Placeholder 2"/>
+          <p:cNvSpPr>
+            <a:spLocks noGrp="1"/>
+          </p:cNvSpPr>
+          <p:nvPr>
+            <p:ph idx="1"/>
+          </p:nvPr>
+        </p:nvSpPr>
+        <p:spPr>
+          <a:xfrm>
+            <a:off x="457200" y="1600200"/>
+            <a:ext cx="8229600" cy="4228061"/>
+          </a:xfrm>
+        </p:spPr>
+        <p:txBody>
+          <a:bodyPr>
+            <a:normAutofit fontScale="92500" lnSpcReduction="10000"/>
+          </a:bodyPr>
+          <a:lstStyle/>
+          <a:p>
+            <a:r>
+              <a:rPr lang="en-US" dirty="0" smtClean="0"/>
+              <a:t>Requirements engineering (gathering)</a:t>
+            </a:r>
+          </a:p>
+          <a:p>
+            <a:r>
+              <a:rPr lang="en-US" dirty="0" smtClean="0"/>
+              <a:t>Use Case Modeling</a:t>
+            </a:r>
+          </a:p>
+          <a:p>
+            <a:r>
+              <a:rPr lang="en-US" dirty="0" smtClean="0"/>
+              <a:t>Activity Diagramming </a:t>
+            </a:r>
+          </a:p>
+          <a:p>
+            <a:r>
+              <a:rPr lang="en-US" dirty="0" smtClean="0"/>
+              <a:t>Data Dictionary + Metadata Development</a:t>
+            </a:r>
+          </a:p>
+          <a:p>
+            <a:r>
+              <a:rPr lang="en-US" dirty="0" smtClean="0"/>
+              <a:t>Prototyping System</a:t>
+            </a:r>
+          </a:p>
+          <a:p>
+            <a:r>
+              <a:rPr lang="en-US" dirty="0" smtClean="0"/>
+              <a:t>Designing and Developing System</a:t>
+            </a:r>
+          </a:p>
+          <a:p>
+            <a:r>
+              <a:rPr lang="en-US" dirty="0" smtClean="0"/>
+              <a:t>Implementation</a:t>
+            </a:r>
+          </a:p>
+          <a:p>
+            <a:r>
+              <a:rPr lang="en-US" dirty="0" smtClean="0"/>
+              <a:t>Evaluation (Formative vs. Summative) </a:t>
+            </a:r>
+          </a:p>
+          <a:p>
+            <a:endParaRPr lang="en-US" dirty="0"/>
+          </a:p>
+        </p:txBody>
+      </p:sp>
+    </p:spTree>
+    <p:extLst>
+      <p:ext uri="{BB962C8B-B14F-4D97-AF65-F5344CB8AC3E}">
+        <p14:creationId xmlns:p14="http://schemas.microsoft.com/office/powerpoint/2010/main" val="2693725221"/>
       </p:ext>
     </p:extLst>
   </p:cSld>

</xml_diff>